<commit_message>
Apresentação final Dica de Lingerie
Pré projeto
</commit_message>
<xml_diff>
--- a/apresentação dica de lingerie.pptx
+++ b/apresentação dica de lingerie.pptx
@@ -5,41 +5,46 @@
     <p:sldMasterId id="2147483657" r:id="rId1"/>
   </p:sldMasterIdLst>
   <p:notesMasterIdLst>
-    <p:notesMasterId r:id="rId19"/>
+    <p:notesMasterId r:id="rId24"/>
   </p:notesMasterIdLst>
   <p:sldIdLst>
     <p:sldId id="256" r:id="rId2"/>
     <p:sldId id="257" r:id="rId3"/>
     <p:sldId id="284" r:id="rId4"/>
     <p:sldId id="287" r:id="rId5"/>
-    <p:sldId id="295" r:id="rId6"/>
+    <p:sldId id="302" r:id="rId6"/>
     <p:sldId id="291" r:id="rId7"/>
     <p:sldId id="292" r:id="rId8"/>
-    <p:sldId id="293" r:id="rId9"/>
-    <p:sldId id="294" r:id="rId10"/>
-    <p:sldId id="262" r:id="rId11"/>
-    <p:sldId id="288" r:id="rId12"/>
-    <p:sldId id="289" r:id="rId13"/>
-    <p:sldId id="290" r:id="rId14"/>
-    <p:sldId id="265" r:id="rId15"/>
-    <p:sldId id="285" r:id="rId16"/>
-    <p:sldId id="286" r:id="rId17"/>
-    <p:sldId id="283" r:id="rId18"/>
+    <p:sldId id="296" r:id="rId9"/>
+    <p:sldId id="293" r:id="rId10"/>
+    <p:sldId id="294" r:id="rId11"/>
+    <p:sldId id="297" r:id="rId12"/>
+    <p:sldId id="298" r:id="rId13"/>
+    <p:sldId id="300" r:id="rId14"/>
+    <p:sldId id="262" r:id="rId15"/>
+    <p:sldId id="288" r:id="rId16"/>
+    <p:sldId id="289" r:id="rId17"/>
+    <p:sldId id="290" r:id="rId18"/>
+    <p:sldId id="265" r:id="rId19"/>
+    <p:sldId id="285" r:id="rId20"/>
+    <p:sldId id="286" r:id="rId21"/>
+    <p:sldId id="301" r:id="rId22"/>
+    <p:sldId id="283" r:id="rId23"/>
   </p:sldIdLst>
   <p:sldSz cx="9144000" cy="6858000" type="screen4x3"/>
   <p:notesSz cx="6858000" cy="9144000"/>
   <p:embeddedFontLst>
     <p:embeddedFont>
       <p:font typeface="Georgia" panose="02040502050405020303" pitchFamily="18" charset="0"/>
-      <p:regular r:id="rId20"/>
-      <p:bold r:id="rId21"/>
-      <p:italic r:id="rId22"/>
-      <p:boldItalic r:id="rId23"/>
+      <p:regular r:id="rId25"/>
+      <p:bold r:id="rId26"/>
+      <p:italic r:id="rId27"/>
+      <p:boldItalic r:id="rId28"/>
     </p:embeddedFont>
     <p:embeddedFont>
       <p:font typeface="Roboto Slab" panose="020B0604020202020204" charset="0"/>
-      <p:regular r:id="rId24"/>
-      <p:bold r:id="rId25"/>
+      <p:regular r:id="rId29"/>
+      <p:bold r:id="rId30"/>
     </p:embeddedFont>
   </p:embeddedFontLst>
   <p:defaultTextStyle>
@@ -837,7 +842,7 @@
   <p:cSld>
     <p:spTree>
       <p:nvGrpSpPr>
-        <p:cNvPr id="1" name="Shape 95"/>
+        <p:cNvPr id="1" name="Shape 128"/>
         <p:cNvGrpSpPr/>
         <p:nvPr/>
       </p:nvGrpSpPr>
@@ -851,7 +856,7 @@
       </p:grpSpPr>
       <p:sp>
         <p:nvSpPr>
-          <p:cNvPr id="96" name="Google Shape;96;g35ed75ccf_015:notes"/>
+          <p:cNvPr id="129" name="Google Shape;129;g35f391192_057:notes"/>
           <p:cNvSpPr>
             <a:spLocks noGrp="1" noRot="1" noChangeAspect="1"/>
           </p:cNvSpPr>
@@ -892,7 +897,7 @@
       </p:sp>
       <p:sp>
         <p:nvSpPr>
-          <p:cNvPr id="97" name="Google Shape;97;g35ed75ccf_015:notes"/>
+          <p:cNvPr id="130" name="Google Shape;130;g35f391192_057:notes"/>
           <p:cNvSpPr txBox="1">
             <a:spLocks noGrp="1"/>
           </p:cNvSpPr>
@@ -931,7 +936,7 @@
     </p:spTree>
     <p:extLst>
       <p:ext uri="{BB962C8B-B14F-4D97-AF65-F5344CB8AC3E}">
-        <p14:creationId xmlns:p14="http://schemas.microsoft.com/office/powerpoint/2010/main" val="4108932857"/>
+        <p14:creationId xmlns:p14="http://schemas.microsoft.com/office/powerpoint/2010/main" val="1133099000"/>
       </p:ext>
     </p:extLst>
   </p:cSld>
@@ -946,7 +951,7 @@
   <p:cSld>
     <p:spTree>
       <p:nvGrpSpPr>
-        <p:cNvPr id="1" name="Shape 95"/>
+        <p:cNvPr id="1" name="Shape 128"/>
         <p:cNvGrpSpPr/>
         <p:nvPr/>
       </p:nvGrpSpPr>
@@ -960,7 +965,7 @@
       </p:grpSpPr>
       <p:sp>
         <p:nvSpPr>
-          <p:cNvPr id="96" name="Google Shape;96;g35ed75ccf_015:notes"/>
+          <p:cNvPr id="129" name="Google Shape;129;g35f391192_057:notes"/>
           <p:cNvSpPr>
             <a:spLocks noGrp="1" noRot="1" noChangeAspect="1"/>
           </p:cNvSpPr>
@@ -1001,7 +1006,7 @@
       </p:sp>
       <p:sp>
         <p:nvSpPr>
-          <p:cNvPr id="97" name="Google Shape;97;g35ed75ccf_015:notes"/>
+          <p:cNvPr id="130" name="Google Shape;130;g35f391192_057:notes"/>
           <p:cNvSpPr txBox="1">
             <a:spLocks noGrp="1"/>
           </p:cNvSpPr>
@@ -1040,7 +1045,7 @@
     </p:spTree>
     <p:extLst>
       <p:ext uri="{BB962C8B-B14F-4D97-AF65-F5344CB8AC3E}">
-        <p14:creationId xmlns:p14="http://schemas.microsoft.com/office/powerpoint/2010/main" val="2628010309"/>
+        <p14:creationId xmlns:p14="http://schemas.microsoft.com/office/powerpoint/2010/main" val="389248716"/>
       </p:ext>
     </p:extLst>
   </p:cSld>
@@ -1055,7 +1060,7 @@
   <p:cSld>
     <p:spTree>
       <p:nvGrpSpPr>
-        <p:cNvPr id="1" name="Shape 95"/>
+        <p:cNvPr id="1" name="Shape 128"/>
         <p:cNvGrpSpPr/>
         <p:nvPr/>
       </p:nvGrpSpPr>
@@ -1069,7 +1074,7 @@
       </p:grpSpPr>
       <p:sp>
         <p:nvSpPr>
-          <p:cNvPr id="96" name="Google Shape;96;g35ed75ccf_015:notes"/>
+          <p:cNvPr id="129" name="Google Shape;129;g35f391192_057:notes"/>
           <p:cNvSpPr>
             <a:spLocks noGrp="1" noRot="1" noChangeAspect="1"/>
           </p:cNvSpPr>
@@ -1110,7 +1115,7 @@
       </p:sp>
       <p:sp>
         <p:nvSpPr>
-          <p:cNvPr id="97" name="Google Shape;97;g35ed75ccf_015:notes"/>
+          <p:cNvPr id="130" name="Google Shape;130;g35f391192_057:notes"/>
           <p:cNvSpPr txBox="1">
             <a:spLocks noGrp="1"/>
           </p:cNvSpPr>
@@ -1149,7 +1154,7 @@
     </p:spTree>
     <p:extLst>
       <p:ext uri="{BB962C8B-B14F-4D97-AF65-F5344CB8AC3E}">
-        <p14:creationId xmlns:p14="http://schemas.microsoft.com/office/powerpoint/2010/main" val="3055145343"/>
+        <p14:creationId xmlns:p14="http://schemas.microsoft.com/office/powerpoint/2010/main" val="2459096218"/>
       </p:ext>
     </p:extLst>
   </p:cSld>
@@ -1164,7 +1169,7 @@
   <p:cSld>
     <p:spTree>
       <p:nvGrpSpPr>
-        <p:cNvPr id="1" name="Shape 95"/>
+        <p:cNvPr id="1" name="Shape 128"/>
         <p:cNvGrpSpPr/>
         <p:nvPr/>
       </p:nvGrpSpPr>
@@ -1178,7 +1183,7 @@
       </p:grpSpPr>
       <p:sp>
         <p:nvSpPr>
-          <p:cNvPr id="96" name="Google Shape;96;g35ed75ccf_015:notes"/>
+          <p:cNvPr id="129" name="Google Shape;129;g35f391192_057:notes"/>
           <p:cNvSpPr>
             <a:spLocks noGrp="1" noRot="1" noChangeAspect="1"/>
           </p:cNvSpPr>
@@ -1219,7 +1224,7 @@
       </p:sp>
       <p:sp>
         <p:nvSpPr>
-          <p:cNvPr id="97" name="Google Shape;97;g35ed75ccf_015:notes"/>
+          <p:cNvPr id="130" name="Google Shape;130;g35f391192_057:notes"/>
           <p:cNvSpPr txBox="1">
             <a:spLocks noGrp="1"/>
           </p:cNvSpPr>
@@ -1258,7 +1263,7 @@
     </p:spTree>
     <p:extLst>
       <p:ext uri="{BB962C8B-B14F-4D97-AF65-F5344CB8AC3E}">
-        <p14:creationId xmlns:p14="http://schemas.microsoft.com/office/powerpoint/2010/main" val="1809182279"/>
+        <p14:creationId xmlns:p14="http://schemas.microsoft.com/office/powerpoint/2010/main" val="3366454753"/>
       </p:ext>
     </p:extLst>
   </p:cSld>
@@ -1273,7 +1278,7 @@
   <p:cSld>
     <p:spTree>
       <p:nvGrpSpPr>
-        <p:cNvPr id="1" name="Shape 128"/>
+        <p:cNvPr id="1" name="Shape 95"/>
         <p:cNvGrpSpPr/>
         <p:nvPr/>
       </p:nvGrpSpPr>
@@ -1287,7 +1292,7 @@
       </p:grpSpPr>
       <p:sp>
         <p:nvSpPr>
-          <p:cNvPr id="129" name="Google Shape;129;g35f391192_057:notes"/>
+          <p:cNvPr id="96" name="Google Shape;96;g35ed75ccf_015:notes"/>
           <p:cNvSpPr>
             <a:spLocks noGrp="1" noRot="1" noChangeAspect="1"/>
           </p:cNvSpPr>
@@ -1328,7 +1333,7 @@
       </p:sp>
       <p:sp>
         <p:nvSpPr>
-          <p:cNvPr id="130" name="Google Shape;130;g35f391192_057:notes"/>
+          <p:cNvPr id="97" name="Google Shape;97;g35ed75ccf_015:notes"/>
           <p:cNvSpPr txBox="1">
             <a:spLocks noGrp="1"/>
           </p:cNvSpPr>
@@ -1367,7 +1372,7 @@
     </p:spTree>
     <p:extLst>
       <p:ext uri="{BB962C8B-B14F-4D97-AF65-F5344CB8AC3E}">
-        <p14:creationId xmlns:p14="http://schemas.microsoft.com/office/powerpoint/2010/main" val="3734301330"/>
+        <p14:creationId xmlns:p14="http://schemas.microsoft.com/office/powerpoint/2010/main" val="4108932857"/>
       </p:ext>
     </p:extLst>
   </p:cSld>
@@ -1382,7 +1387,7 @@
   <p:cSld>
     <p:spTree>
       <p:nvGrpSpPr>
-        <p:cNvPr id="1" name="Shape 128"/>
+        <p:cNvPr id="1" name="Shape 95"/>
         <p:cNvGrpSpPr/>
         <p:nvPr/>
       </p:nvGrpSpPr>
@@ -1396,7 +1401,7 @@
       </p:grpSpPr>
       <p:sp>
         <p:nvSpPr>
-          <p:cNvPr id="129" name="Google Shape;129;g35f391192_057:notes"/>
+          <p:cNvPr id="96" name="Google Shape;96;g35ed75ccf_015:notes"/>
           <p:cNvSpPr>
             <a:spLocks noGrp="1" noRot="1" noChangeAspect="1"/>
           </p:cNvSpPr>
@@ -1437,7 +1442,7 @@
       </p:sp>
       <p:sp>
         <p:nvSpPr>
-          <p:cNvPr id="130" name="Google Shape;130;g35f391192_057:notes"/>
+          <p:cNvPr id="97" name="Google Shape;97;g35ed75ccf_015:notes"/>
           <p:cNvSpPr txBox="1">
             <a:spLocks noGrp="1"/>
           </p:cNvSpPr>
@@ -1476,7 +1481,7 @@
     </p:spTree>
     <p:extLst>
       <p:ext uri="{BB962C8B-B14F-4D97-AF65-F5344CB8AC3E}">
-        <p14:creationId xmlns:p14="http://schemas.microsoft.com/office/powerpoint/2010/main" val="2000676843"/>
+        <p14:creationId xmlns:p14="http://schemas.microsoft.com/office/powerpoint/2010/main" val="2628010309"/>
       </p:ext>
     </p:extLst>
   </p:cSld>
@@ -1491,7 +1496,7 @@
   <p:cSld>
     <p:spTree>
       <p:nvGrpSpPr>
-        <p:cNvPr id="1" name="Shape 128"/>
+        <p:cNvPr id="1" name="Shape 95"/>
         <p:cNvGrpSpPr/>
         <p:nvPr/>
       </p:nvGrpSpPr>
@@ -1505,7 +1510,7 @@
       </p:grpSpPr>
       <p:sp>
         <p:nvSpPr>
-          <p:cNvPr id="129" name="Google Shape;129;g35f391192_057:notes"/>
+          <p:cNvPr id="96" name="Google Shape;96;g35ed75ccf_015:notes"/>
           <p:cNvSpPr>
             <a:spLocks noGrp="1" noRot="1" noChangeAspect="1"/>
           </p:cNvSpPr>
@@ -1546,7 +1551,7 @@
       </p:sp>
       <p:sp>
         <p:nvSpPr>
-          <p:cNvPr id="130" name="Google Shape;130;g35f391192_057:notes"/>
+          <p:cNvPr id="97" name="Google Shape;97;g35ed75ccf_015:notes"/>
           <p:cNvSpPr txBox="1">
             <a:spLocks noGrp="1"/>
           </p:cNvSpPr>
@@ -1585,7 +1590,7 @@
     </p:spTree>
     <p:extLst>
       <p:ext uri="{BB962C8B-B14F-4D97-AF65-F5344CB8AC3E}">
-        <p14:creationId xmlns:p14="http://schemas.microsoft.com/office/powerpoint/2010/main" val="4093018032"/>
+        <p14:creationId xmlns:p14="http://schemas.microsoft.com/office/powerpoint/2010/main" val="3055145343"/>
       </p:ext>
     </p:extLst>
   </p:cSld>
@@ -1600,7 +1605,7 @@
   <p:cSld>
     <p:spTree>
       <p:nvGrpSpPr>
-        <p:cNvPr id="1" name="Shape 775"/>
+        <p:cNvPr id="1" name="Shape 95"/>
         <p:cNvGrpSpPr/>
         <p:nvPr/>
       </p:nvGrpSpPr>
@@ -1614,7 +1619,7 @@
       </p:grpSpPr>
       <p:sp>
         <p:nvSpPr>
-          <p:cNvPr id="776" name="Google Shape;776;g14fb134d9e_17_1:notes"/>
+          <p:cNvPr id="96" name="Google Shape;96;g35ed75ccf_015:notes"/>
           <p:cNvSpPr>
             <a:spLocks noGrp="1" noRot="1" noChangeAspect="1"/>
           </p:cNvSpPr>
@@ -1655,7 +1660,7 @@
       </p:sp>
       <p:sp>
         <p:nvSpPr>
-          <p:cNvPr id="777" name="Google Shape;777;g14fb134d9e_17_1:notes"/>
+          <p:cNvPr id="97" name="Google Shape;97;g35ed75ccf_015:notes"/>
           <p:cNvSpPr txBox="1">
             <a:spLocks noGrp="1"/>
           </p:cNvSpPr>
@@ -1694,7 +1699,225 @@
     </p:spTree>
     <p:extLst>
       <p:ext uri="{BB962C8B-B14F-4D97-AF65-F5344CB8AC3E}">
-        <p14:creationId xmlns:p14="http://schemas.microsoft.com/office/powerpoint/2010/main" val="348893725"/>
+        <p14:creationId xmlns:p14="http://schemas.microsoft.com/office/powerpoint/2010/main" val="1809182279"/>
+      </p:ext>
+    </p:extLst>
+  </p:cSld>
+  <p:clrMapOvr>
+    <a:masterClrMapping/>
+  </p:clrMapOvr>
+</p:notes>
+</file>
+
+<file path=ppt/notesSlides/notesSlide18.xml><?xml version="1.0" encoding="utf-8"?>
+<p:notes xmlns:a="http://schemas.openxmlformats.org/drawingml/2006/main" xmlns:r="http://schemas.openxmlformats.org/officeDocument/2006/relationships" xmlns:p="http://schemas.openxmlformats.org/presentationml/2006/main" showMasterSp="0" showMasterPhAnim="0">
+  <p:cSld>
+    <p:spTree>
+      <p:nvGrpSpPr>
+        <p:cNvPr id="1" name="Shape 128"/>
+        <p:cNvGrpSpPr/>
+        <p:nvPr/>
+      </p:nvGrpSpPr>
+      <p:grpSpPr>
+        <a:xfrm>
+          <a:off x="0" y="0"/>
+          <a:ext cx="0" cy="0"/>
+          <a:chOff x="0" y="0"/>
+          <a:chExt cx="0" cy="0"/>
+        </a:xfrm>
+      </p:grpSpPr>
+      <p:sp>
+        <p:nvSpPr>
+          <p:cNvPr id="129" name="Google Shape;129;g35f391192_057:notes"/>
+          <p:cNvSpPr>
+            <a:spLocks noGrp="1" noRot="1" noChangeAspect="1"/>
+          </p:cNvSpPr>
+          <p:nvPr>
+            <p:ph type="sldImg" idx="2"/>
+          </p:nvPr>
+        </p:nvSpPr>
+        <p:spPr>
+          <a:xfrm>
+            <a:off x="1143000" y="685800"/>
+            <a:ext cx="4572000" cy="3429000"/>
+          </a:xfrm>
+          <a:custGeom>
+            <a:avLst/>
+            <a:gdLst/>
+            <a:ahLst/>
+            <a:cxnLst/>
+            <a:rect l="l" t="t" r="r" b="b"/>
+            <a:pathLst>
+              <a:path w="120000" h="120000" extrusionOk="0">
+                <a:moveTo>
+                  <a:pt x="0" y="0"/>
+                </a:moveTo>
+                <a:lnTo>
+                  <a:pt x="120000" y="0"/>
+                </a:lnTo>
+                <a:lnTo>
+                  <a:pt x="120000" y="120000"/>
+                </a:lnTo>
+                <a:lnTo>
+                  <a:pt x="0" y="120000"/>
+                </a:lnTo>
+                <a:close/>
+              </a:path>
+            </a:pathLst>
+          </a:custGeom>
+        </p:spPr>
+      </p:sp>
+      <p:sp>
+        <p:nvSpPr>
+          <p:cNvPr id="130" name="Google Shape;130;g35f391192_057:notes"/>
+          <p:cNvSpPr txBox="1">
+            <a:spLocks noGrp="1"/>
+          </p:cNvSpPr>
+          <p:nvPr>
+            <p:ph type="body" idx="1"/>
+          </p:nvPr>
+        </p:nvSpPr>
+        <p:spPr>
+          <a:xfrm>
+            <a:off x="685800" y="4343400"/>
+            <a:ext cx="5486400" cy="4114800"/>
+          </a:xfrm>
+          <a:prstGeom prst="rect">
+            <a:avLst/>
+          </a:prstGeom>
+        </p:spPr>
+        <p:txBody>
+          <a:bodyPr spcFirstLastPara="1" wrap="square" lIns="91425" tIns="91425" rIns="91425" bIns="91425" anchor="t" anchorCtr="0">
+            <a:noAutofit/>
+          </a:bodyPr>
+          <a:lstStyle/>
+          <a:p>
+            <a:pPr marL="0" lvl="0" indent="0" algn="l" rtl="0">
+              <a:spcBef>
+                <a:spcPts val="0"/>
+              </a:spcBef>
+              <a:spcAft>
+                <a:spcPts val="0"/>
+              </a:spcAft>
+              <a:buNone/>
+            </a:pPr>
+            <a:endParaRPr/>
+          </a:p>
+        </p:txBody>
+      </p:sp>
+    </p:spTree>
+    <p:extLst>
+      <p:ext uri="{BB962C8B-B14F-4D97-AF65-F5344CB8AC3E}">
+        <p14:creationId xmlns:p14="http://schemas.microsoft.com/office/powerpoint/2010/main" val="3734301330"/>
+      </p:ext>
+    </p:extLst>
+  </p:cSld>
+  <p:clrMapOvr>
+    <a:masterClrMapping/>
+  </p:clrMapOvr>
+</p:notes>
+</file>
+
+<file path=ppt/notesSlides/notesSlide19.xml><?xml version="1.0" encoding="utf-8"?>
+<p:notes xmlns:a="http://schemas.openxmlformats.org/drawingml/2006/main" xmlns:r="http://schemas.openxmlformats.org/officeDocument/2006/relationships" xmlns:p="http://schemas.openxmlformats.org/presentationml/2006/main" showMasterSp="0" showMasterPhAnim="0">
+  <p:cSld>
+    <p:spTree>
+      <p:nvGrpSpPr>
+        <p:cNvPr id="1" name="Shape 128"/>
+        <p:cNvGrpSpPr/>
+        <p:nvPr/>
+      </p:nvGrpSpPr>
+      <p:grpSpPr>
+        <a:xfrm>
+          <a:off x="0" y="0"/>
+          <a:ext cx="0" cy="0"/>
+          <a:chOff x="0" y="0"/>
+          <a:chExt cx="0" cy="0"/>
+        </a:xfrm>
+      </p:grpSpPr>
+      <p:sp>
+        <p:nvSpPr>
+          <p:cNvPr id="129" name="Google Shape;129;g35f391192_057:notes"/>
+          <p:cNvSpPr>
+            <a:spLocks noGrp="1" noRot="1" noChangeAspect="1"/>
+          </p:cNvSpPr>
+          <p:nvPr>
+            <p:ph type="sldImg" idx="2"/>
+          </p:nvPr>
+        </p:nvSpPr>
+        <p:spPr>
+          <a:xfrm>
+            <a:off x="1143000" y="685800"/>
+            <a:ext cx="4572000" cy="3429000"/>
+          </a:xfrm>
+          <a:custGeom>
+            <a:avLst/>
+            <a:gdLst/>
+            <a:ahLst/>
+            <a:cxnLst/>
+            <a:rect l="l" t="t" r="r" b="b"/>
+            <a:pathLst>
+              <a:path w="120000" h="120000" extrusionOk="0">
+                <a:moveTo>
+                  <a:pt x="0" y="0"/>
+                </a:moveTo>
+                <a:lnTo>
+                  <a:pt x="120000" y="0"/>
+                </a:lnTo>
+                <a:lnTo>
+                  <a:pt x="120000" y="120000"/>
+                </a:lnTo>
+                <a:lnTo>
+                  <a:pt x="0" y="120000"/>
+                </a:lnTo>
+                <a:close/>
+              </a:path>
+            </a:pathLst>
+          </a:custGeom>
+        </p:spPr>
+      </p:sp>
+      <p:sp>
+        <p:nvSpPr>
+          <p:cNvPr id="130" name="Google Shape;130;g35f391192_057:notes"/>
+          <p:cNvSpPr txBox="1">
+            <a:spLocks noGrp="1"/>
+          </p:cNvSpPr>
+          <p:nvPr>
+            <p:ph type="body" idx="1"/>
+          </p:nvPr>
+        </p:nvSpPr>
+        <p:spPr>
+          <a:xfrm>
+            <a:off x="685800" y="4343400"/>
+            <a:ext cx="5486400" cy="4114800"/>
+          </a:xfrm>
+          <a:prstGeom prst="rect">
+            <a:avLst/>
+          </a:prstGeom>
+        </p:spPr>
+        <p:txBody>
+          <a:bodyPr spcFirstLastPara="1" wrap="square" lIns="91425" tIns="91425" rIns="91425" bIns="91425" anchor="t" anchorCtr="0">
+            <a:noAutofit/>
+          </a:bodyPr>
+          <a:lstStyle/>
+          <a:p>
+            <a:pPr marL="0" lvl="0" indent="0" algn="l" rtl="0">
+              <a:spcBef>
+                <a:spcPts val="0"/>
+              </a:spcBef>
+              <a:spcAft>
+                <a:spcPts val="0"/>
+              </a:spcAft>
+              <a:buNone/>
+            </a:pPr>
+            <a:endParaRPr/>
+          </a:p>
+        </p:txBody>
+      </p:sp>
+    </p:spTree>
+    <p:extLst>
+      <p:ext uri="{BB962C8B-B14F-4D97-AF65-F5344CB8AC3E}">
+        <p14:creationId xmlns:p14="http://schemas.microsoft.com/office/powerpoint/2010/main" val="2000676843"/>
       </p:ext>
     </p:extLst>
   </p:cSld>
@@ -1804,6 +2027,333 @@
     <p:extLst>
       <p:ext uri="{BB962C8B-B14F-4D97-AF65-F5344CB8AC3E}">
         <p14:creationId xmlns:p14="http://schemas.microsoft.com/office/powerpoint/2010/main" val="3836286227"/>
+      </p:ext>
+    </p:extLst>
+  </p:cSld>
+  <p:clrMapOvr>
+    <a:masterClrMapping/>
+  </p:clrMapOvr>
+</p:notes>
+</file>
+
+<file path=ppt/notesSlides/notesSlide20.xml><?xml version="1.0" encoding="utf-8"?>
+<p:notes xmlns:a="http://schemas.openxmlformats.org/drawingml/2006/main" xmlns:r="http://schemas.openxmlformats.org/officeDocument/2006/relationships" xmlns:p="http://schemas.openxmlformats.org/presentationml/2006/main" showMasterSp="0" showMasterPhAnim="0">
+  <p:cSld>
+    <p:spTree>
+      <p:nvGrpSpPr>
+        <p:cNvPr id="1" name="Shape 128"/>
+        <p:cNvGrpSpPr/>
+        <p:nvPr/>
+      </p:nvGrpSpPr>
+      <p:grpSpPr>
+        <a:xfrm>
+          <a:off x="0" y="0"/>
+          <a:ext cx="0" cy="0"/>
+          <a:chOff x="0" y="0"/>
+          <a:chExt cx="0" cy="0"/>
+        </a:xfrm>
+      </p:grpSpPr>
+      <p:sp>
+        <p:nvSpPr>
+          <p:cNvPr id="129" name="Google Shape;129;g35f391192_057:notes"/>
+          <p:cNvSpPr>
+            <a:spLocks noGrp="1" noRot="1" noChangeAspect="1"/>
+          </p:cNvSpPr>
+          <p:nvPr>
+            <p:ph type="sldImg" idx="2"/>
+          </p:nvPr>
+        </p:nvSpPr>
+        <p:spPr>
+          <a:xfrm>
+            <a:off x="1143000" y="685800"/>
+            <a:ext cx="4572000" cy="3429000"/>
+          </a:xfrm>
+          <a:custGeom>
+            <a:avLst/>
+            <a:gdLst/>
+            <a:ahLst/>
+            <a:cxnLst/>
+            <a:rect l="l" t="t" r="r" b="b"/>
+            <a:pathLst>
+              <a:path w="120000" h="120000" extrusionOk="0">
+                <a:moveTo>
+                  <a:pt x="0" y="0"/>
+                </a:moveTo>
+                <a:lnTo>
+                  <a:pt x="120000" y="0"/>
+                </a:lnTo>
+                <a:lnTo>
+                  <a:pt x="120000" y="120000"/>
+                </a:lnTo>
+                <a:lnTo>
+                  <a:pt x="0" y="120000"/>
+                </a:lnTo>
+                <a:close/>
+              </a:path>
+            </a:pathLst>
+          </a:custGeom>
+        </p:spPr>
+      </p:sp>
+      <p:sp>
+        <p:nvSpPr>
+          <p:cNvPr id="130" name="Google Shape;130;g35f391192_057:notes"/>
+          <p:cNvSpPr txBox="1">
+            <a:spLocks noGrp="1"/>
+          </p:cNvSpPr>
+          <p:nvPr>
+            <p:ph type="body" idx="1"/>
+          </p:nvPr>
+        </p:nvSpPr>
+        <p:spPr>
+          <a:xfrm>
+            <a:off x="685800" y="4343400"/>
+            <a:ext cx="5486400" cy="4114800"/>
+          </a:xfrm>
+          <a:prstGeom prst="rect">
+            <a:avLst/>
+          </a:prstGeom>
+        </p:spPr>
+        <p:txBody>
+          <a:bodyPr spcFirstLastPara="1" wrap="square" lIns="91425" tIns="91425" rIns="91425" bIns="91425" anchor="t" anchorCtr="0">
+            <a:noAutofit/>
+          </a:bodyPr>
+          <a:lstStyle/>
+          <a:p>
+            <a:pPr marL="0" lvl="0" indent="0" algn="l" rtl="0">
+              <a:spcBef>
+                <a:spcPts val="0"/>
+              </a:spcBef>
+              <a:spcAft>
+                <a:spcPts val="0"/>
+              </a:spcAft>
+              <a:buNone/>
+            </a:pPr>
+            <a:endParaRPr/>
+          </a:p>
+        </p:txBody>
+      </p:sp>
+    </p:spTree>
+    <p:extLst>
+      <p:ext uri="{BB962C8B-B14F-4D97-AF65-F5344CB8AC3E}">
+        <p14:creationId xmlns:p14="http://schemas.microsoft.com/office/powerpoint/2010/main" val="4093018032"/>
+      </p:ext>
+    </p:extLst>
+  </p:cSld>
+  <p:clrMapOvr>
+    <a:masterClrMapping/>
+  </p:clrMapOvr>
+</p:notes>
+</file>
+
+<file path=ppt/notesSlides/notesSlide21.xml><?xml version="1.0" encoding="utf-8"?>
+<p:notes xmlns:a="http://schemas.openxmlformats.org/drawingml/2006/main" xmlns:r="http://schemas.openxmlformats.org/officeDocument/2006/relationships" xmlns:p="http://schemas.openxmlformats.org/presentationml/2006/main" showMasterSp="0" showMasterPhAnim="0">
+  <p:cSld>
+    <p:spTree>
+      <p:nvGrpSpPr>
+        <p:cNvPr id="1" name="Shape 128"/>
+        <p:cNvGrpSpPr/>
+        <p:nvPr/>
+      </p:nvGrpSpPr>
+      <p:grpSpPr>
+        <a:xfrm>
+          <a:off x="0" y="0"/>
+          <a:ext cx="0" cy="0"/>
+          <a:chOff x="0" y="0"/>
+          <a:chExt cx="0" cy="0"/>
+        </a:xfrm>
+      </p:grpSpPr>
+      <p:sp>
+        <p:nvSpPr>
+          <p:cNvPr id="129" name="Google Shape;129;g35f391192_057:notes"/>
+          <p:cNvSpPr>
+            <a:spLocks noGrp="1" noRot="1" noChangeAspect="1"/>
+          </p:cNvSpPr>
+          <p:nvPr>
+            <p:ph type="sldImg" idx="2"/>
+          </p:nvPr>
+        </p:nvSpPr>
+        <p:spPr>
+          <a:xfrm>
+            <a:off x="1143000" y="685800"/>
+            <a:ext cx="4572000" cy="3429000"/>
+          </a:xfrm>
+          <a:custGeom>
+            <a:avLst/>
+            <a:gdLst/>
+            <a:ahLst/>
+            <a:cxnLst/>
+            <a:rect l="l" t="t" r="r" b="b"/>
+            <a:pathLst>
+              <a:path w="120000" h="120000" extrusionOk="0">
+                <a:moveTo>
+                  <a:pt x="0" y="0"/>
+                </a:moveTo>
+                <a:lnTo>
+                  <a:pt x="120000" y="0"/>
+                </a:lnTo>
+                <a:lnTo>
+                  <a:pt x="120000" y="120000"/>
+                </a:lnTo>
+                <a:lnTo>
+                  <a:pt x="0" y="120000"/>
+                </a:lnTo>
+                <a:close/>
+              </a:path>
+            </a:pathLst>
+          </a:custGeom>
+        </p:spPr>
+      </p:sp>
+      <p:sp>
+        <p:nvSpPr>
+          <p:cNvPr id="130" name="Google Shape;130;g35f391192_057:notes"/>
+          <p:cNvSpPr txBox="1">
+            <a:spLocks noGrp="1"/>
+          </p:cNvSpPr>
+          <p:nvPr>
+            <p:ph type="body" idx="1"/>
+          </p:nvPr>
+        </p:nvSpPr>
+        <p:spPr>
+          <a:xfrm>
+            <a:off x="685800" y="4343400"/>
+            <a:ext cx="5486400" cy="4114800"/>
+          </a:xfrm>
+          <a:prstGeom prst="rect">
+            <a:avLst/>
+          </a:prstGeom>
+        </p:spPr>
+        <p:txBody>
+          <a:bodyPr spcFirstLastPara="1" wrap="square" lIns="91425" tIns="91425" rIns="91425" bIns="91425" anchor="t" anchorCtr="0">
+            <a:noAutofit/>
+          </a:bodyPr>
+          <a:lstStyle/>
+          <a:p>
+            <a:pPr marL="0" lvl="0" indent="0" algn="l" rtl="0">
+              <a:spcBef>
+                <a:spcPts val="0"/>
+              </a:spcBef>
+              <a:spcAft>
+                <a:spcPts val="0"/>
+              </a:spcAft>
+              <a:buNone/>
+            </a:pPr>
+            <a:endParaRPr/>
+          </a:p>
+        </p:txBody>
+      </p:sp>
+    </p:spTree>
+    <p:extLst>
+      <p:ext uri="{BB962C8B-B14F-4D97-AF65-F5344CB8AC3E}">
+        <p14:creationId xmlns:p14="http://schemas.microsoft.com/office/powerpoint/2010/main" val="2276872322"/>
+      </p:ext>
+    </p:extLst>
+  </p:cSld>
+  <p:clrMapOvr>
+    <a:masterClrMapping/>
+  </p:clrMapOvr>
+</p:notes>
+</file>
+
+<file path=ppt/notesSlides/notesSlide22.xml><?xml version="1.0" encoding="utf-8"?>
+<p:notes xmlns:a="http://schemas.openxmlformats.org/drawingml/2006/main" xmlns:r="http://schemas.openxmlformats.org/officeDocument/2006/relationships" xmlns:p="http://schemas.openxmlformats.org/presentationml/2006/main" showMasterSp="0" showMasterPhAnim="0">
+  <p:cSld>
+    <p:spTree>
+      <p:nvGrpSpPr>
+        <p:cNvPr id="1" name="Shape 775"/>
+        <p:cNvGrpSpPr/>
+        <p:nvPr/>
+      </p:nvGrpSpPr>
+      <p:grpSpPr>
+        <a:xfrm>
+          <a:off x="0" y="0"/>
+          <a:ext cx="0" cy="0"/>
+          <a:chOff x="0" y="0"/>
+          <a:chExt cx="0" cy="0"/>
+        </a:xfrm>
+      </p:grpSpPr>
+      <p:sp>
+        <p:nvSpPr>
+          <p:cNvPr id="776" name="Google Shape;776;g14fb134d9e_17_1:notes"/>
+          <p:cNvSpPr>
+            <a:spLocks noGrp="1" noRot="1" noChangeAspect="1"/>
+          </p:cNvSpPr>
+          <p:nvPr>
+            <p:ph type="sldImg" idx="2"/>
+          </p:nvPr>
+        </p:nvSpPr>
+        <p:spPr>
+          <a:xfrm>
+            <a:off x="1143000" y="685800"/>
+            <a:ext cx="4572000" cy="3429000"/>
+          </a:xfrm>
+          <a:custGeom>
+            <a:avLst/>
+            <a:gdLst/>
+            <a:ahLst/>
+            <a:cxnLst/>
+            <a:rect l="l" t="t" r="r" b="b"/>
+            <a:pathLst>
+              <a:path w="120000" h="120000" extrusionOk="0">
+                <a:moveTo>
+                  <a:pt x="0" y="0"/>
+                </a:moveTo>
+                <a:lnTo>
+                  <a:pt x="120000" y="0"/>
+                </a:lnTo>
+                <a:lnTo>
+                  <a:pt x="120000" y="120000"/>
+                </a:lnTo>
+                <a:lnTo>
+                  <a:pt x="0" y="120000"/>
+                </a:lnTo>
+                <a:close/>
+              </a:path>
+            </a:pathLst>
+          </a:custGeom>
+        </p:spPr>
+      </p:sp>
+      <p:sp>
+        <p:nvSpPr>
+          <p:cNvPr id="777" name="Google Shape;777;g14fb134d9e_17_1:notes"/>
+          <p:cNvSpPr txBox="1">
+            <a:spLocks noGrp="1"/>
+          </p:cNvSpPr>
+          <p:nvPr>
+            <p:ph type="body" idx="1"/>
+          </p:nvPr>
+        </p:nvSpPr>
+        <p:spPr>
+          <a:xfrm>
+            <a:off x="685800" y="4343400"/>
+            <a:ext cx="5486400" cy="4114800"/>
+          </a:xfrm>
+          <a:prstGeom prst="rect">
+            <a:avLst/>
+          </a:prstGeom>
+        </p:spPr>
+        <p:txBody>
+          <a:bodyPr spcFirstLastPara="1" wrap="square" lIns="91425" tIns="91425" rIns="91425" bIns="91425" anchor="t" anchorCtr="0">
+            <a:noAutofit/>
+          </a:bodyPr>
+          <a:lstStyle/>
+          <a:p>
+            <a:pPr marL="0" lvl="0" indent="0" algn="l" rtl="0">
+              <a:spcBef>
+                <a:spcPts val="0"/>
+              </a:spcBef>
+              <a:spcAft>
+                <a:spcPts val="0"/>
+              </a:spcAft>
+              <a:buNone/>
+            </a:pPr>
+            <a:endParaRPr/>
+          </a:p>
+        </p:txBody>
+      </p:sp>
+    </p:spTree>
+    <p:extLst>
+      <p:ext uri="{BB962C8B-B14F-4D97-AF65-F5344CB8AC3E}">
+        <p14:creationId xmlns:p14="http://schemas.microsoft.com/office/powerpoint/2010/main" val="348893725"/>
       </p:ext>
     </p:extLst>
   </p:cSld>
@@ -2130,7 +2680,7 @@
     </p:spTree>
     <p:extLst>
       <p:ext uri="{BB962C8B-B14F-4D97-AF65-F5344CB8AC3E}">
-        <p14:creationId xmlns:p14="http://schemas.microsoft.com/office/powerpoint/2010/main" val="2086761445"/>
+        <p14:creationId xmlns:p14="http://schemas.microsoft.com/office/powerpoint/2010/main" val="3268327098"/>
       </p:ext>
     </p:extLst>
   </p:cSld>
@@ -2457,7 +3007,7 @@
     </p:spTree>
     <p:extLst>
       <p:ext uri="{BB962C8B-B14F-4D97-AF65-F5344CB8AC3E}">
-        <p14:creationId xmlns:p14="http://schemas.microsoft.com/office/powerpoint/2010/main" val="556722836"/>
+        <p14:creationId xmlns:p14="http://schemas.microsoft.com/office/powerpoint/2010/main" val="1972616215"/>
       </p:ext>
     </p:extLst>
   </p:cSld>
@@ -2566,7 +3116,7 @@
     </p:spTree>
     <p:extLst>
       <p:ext uri="{BB962C8B-B14F-4D97-AF65-F5344CB8AC3E}">
-        <p14:creationId xmlns:p14="http://schemas.microsoft.com/office/powerpoint/2010/main" val="1133099000"/>
+        <p14:creationId xmlns:p14="http://schemas.microsoft.com/office/powerpoint/2010/main" val="556722836"/>
       </p:ext>
     </p:extLst>
   </p:cSld>
@@ -5319,6 +5869,13 @@
           <a:prstGeom prst="rect">
             <a:avLst/>
           </a:prstGeom>
+          <a:ln>
+            <a:solidFill>
+              <a:schemeClr val="bg2">
+                <a:lumMod val="75000"/>
+              </a:schemeClr>
+            </a:solidFill>
+          </a:ln>
         </p:spPr>
         <p:txBody>
           <a:bodyPr spcFirstLastPara="1" wrap="square" lIns="91425" tIns="91425" rIns="91425" bIns="91425" anchor="b" anchorCtr="0">
@@ -5326,20 +5883,114 @@
           </a:bodyPr>
           <a:lstStyle/>
           <a:p>
-            <a:pPr marL="0" lvl="0" indent="0" algn="ctr" rtl="0">
-              <a:spcBef>
-                <a:spcPts val="0"/>
-              </a:spcBef>
-              <a:spcAft>
-                <a:spcPts val="0"/>
-              </a:spcAft>
-              <a:buNone/>
-            </a:pPr>
-            <a:r>
-              <a:rPr lang="en" dirty="0" smtClean="0"/>
-              <a:t>Proposta de Aplicativo para mães e futuras mães</a:t>
-            </a:r>
-            <a:endParaRPr dirty="0"/>
+            <a:pPr lvl="0" algn="ctr"/>
+            <a:r>
+              <a:rPr lang="pt-BR" sz="3600" b="1" dirty="0"/>
+              <a:t>DESENVOLVIMENTO DE APLICATIVO ANDROID PARA </a:t>
+            </a:r>
+            <a:r>
+              <a:rPr lang="pt-BR" sz="3600" b="1" dirty="0" smtClean="0"/>
+              <a:t>GESTANTES</a:t>
+            </a:r>
+            <a:r>
+              <a:rPr lang="pt-BR" sz="4000" dirty="0" smtClean="0"/>
+              <a:t/>
+            </a:r>
+            <a:br>
+              <a:rPr lang="pt-BR" sz="4000" dirty="0" smtClean="0"/>
+            </a:br>
+            <a:endParaRPr sz="4000" dirty="0"/>
+          </a:p>
+        </p:txBody>
+      </p:sp>
+      <p:sp>
+        <p:nvSpPr>
+          <p:cNvPr id="2" name="CaixaDeTexto 1"/>
+          <p:cNvSpPr txBox="1"/>
+          <p:nvPr/>
+        </p:nvSpPr>
+        <p:spPr>
+          <a:xfrm>
+            <a:off x="3737113" y="596347"/>
+            <a:ext cx="2552302" cy="738664"/>
+          </a:xfrm>
+          <a:prstGeom prst="rect">
+            <a:avLst/>
+          </a:prstGeom>
+          <a:noFill/>
+        </p:spPr>
+        <p:txBody>
+          <a:bodyPr wrap="none" rtlCol="0">
+            <a:spAutoFit/>
+          </a:bodyPr>
+          <a:lstStyle/>
+          <a:p>
+            <a:pPr algn="ctr"/>
+            <a:r>
+              <a:rPr lang="pt-BR" dirty="0"/>
+              <a:t>Centro Universitário </a:t>
+            </a:r>
+            <a:r>
+              <a:rPr lang="pt-BR" dirty="0" smtClean="0"/>
+              <a:t>Redentor</a:t>
+            </a:r>
+          </a:p>
+          <a:p>
+            <a:pPr algn="ctr"/>
+            <a:r>
+              <a:rPr lang="pt-BR" dirty="0" smtClean="0"/>
+              <a:t>Sistemas </a:t>
+            </a:r>
+            <a:r>
+              <a:rPr lang="pt-BR" dirty="0"/>
+              <a:t>de </a:t>
+            </a:r>
+            <a:r>
+              <a:rPr lang="pt-BR" dirty="0" smtClean="0"/>
+              <a:t>Informação</a:t>
+            </a:r>
+          </a:p>
+          <a:p>
+            <a:pPr algn="ctr"/>
+            <a:r>
+              <a:rPr lang="pt-BR" dirty="0" smtClean="0"/>
+              <a:t>Itaperuna-RJ</a:t>
+            </a:r>
+            <a:endParaRPr lang="pt-BR" dirty="0"/>
+          </a:p>
+        </p:txBody>
+      </p:sp>
+      <p:sp>
+        <p:nvSpPr>
+          <p:cNvPr id="3" name="CaixaDeTexto 2"/>
+          <p:cNvSpPr txBox="1"/>
+          <p:nvPr/>
+        </p:nvSpPr>
+        <p:spPr>
+          <a:xfrm>
+            <a:off x="3769909" y="1418112"/>
+            <a:ext cx="2523448" cy="307777"/>
+          </a:xfrm>
+          <a:prstGeom prst="rect">
+            <a:avLst/>
+          </a:prstGeom>
+          <a:noFill/>
+        </p:spPr>
+        <p:txBody>
+          <a:bodyPr wrap="none" rtlCol="0">
+            <a:spAutoFit/>
+          </a:bodyPr>
+          <a:lstStyle/>
+          <a:p>
+            <a:r>
+              <a:rPr lang="pt-BR" b="1" dirty="0" smtClean="0"/>
+              <a:t>Edgar Salardani </a:t>
+            </a:r>
+            <a:r>
+              <a:rPr lang="pt-BR" b="1" dirty="0" err="1" smtClean="0"/>
+              <a:t>Senhorello</a:t>
+            </a:r>
+            <a:endParaRPr lang="pt-BR" b="1" dirty="0"/>
           </a:p>
         </p:txBody>
       </p:sp>
@@ -5363,6 +6014,722 @@
   <p:cSld>
     <p:spTree>
       <p:nvGrpSpPr>
+        <p:cNvPr id="1" name="Shape 131"/>
+        <p:cNvGrpSpPr/>
+        <p:nvPr/>
+      </p:nvGrpSpPr>
+      <p:grpSpPr>
+        <a:xfrm>
+          <a:off x="0" y="0"/>
+          <a:ext cx="0" cy="0"/>
+          <a:chOff x="0" y="0"/>
+          <a:chExt cx="0" cy="0"/>
+        </a:xfrm>
+      </p:grpSpPr>
+      <p:sp>
+        <p:nvSpPr>
+          <p:cNvPr id="132" name="Google Shape;132;p20"/>
+          <p:cNvSpPr txBox="1">
+            <a:spLocks noGrp="1"/>
+          </p:cNvSpPr>
+          <p:nvPr>
+            <p:ph type="title"/>
+          </p:nvPr>
+        </p:nvSpPr>
+        <p:spPr>
+          <a:xfrm>
+            <a:off x="533400" y="533400"/>
+            <a:ext cx="2382078" cy="1070113"/>
+          </a:xfrm>
+          <a:prstGeom prst="rect">
+            <a:avLst/>
+          </a:prstGeom>
+          <a:ln>
+            <a:solidFill>
+              <a:schemeClr val="tx1"/>
+            </a:solidFill>
+          </a:ln>
+        </p:spPr>
+        <p:txBody>
+          <a:bodyPr spcFirstLastPara="1" wrap="square" lIns="91425" tIns="91425" rIns="91425" bIns="91425" anchor="t" anchorCtr="0">
+            <a:noAutofit/>
+          </a:bodyPr>
+          <a:lstStyle/>
+          <a:p>
+            <a:pPr marL="0" lvl="0" indent="0" algn="ctr" rtl="0">
+              <a:spcBef>
+                <a:spcPts val="0"/>
+              </a:spcBef>
+              <a:spcAft>
+                <a:spcPts val="0"/>
+              </a:spcAft>
+              <a:buNone/>
+            </a:pPr>
+            <a:r>
+              <a:rPr lang="en" dirty="0" smtClean="0">
+                <a:solidFill>
+                  <a:schemeClr val="tx1"/>
+                </a:solidFill>
+              </a:rPr>
+              <a:t>Referencial Teórico</a:t>
+            </a:r>
+            <a:endParaRPr dirty="0">
+              <a:solidFill>
+                <a:schemeClr val="tx1"/>
+              </a:solidFill>
+            </a:endParaRPr>
+          </a:p>
+        </p:txBody>
+      </p:sp>
+      <p:sp>
+        <p:nvSpPr>
+          <p:cNvPr id="133" name="Google Shape;133;p20"/>
+          <p:cNvSpPr txBox="1">
+            <a:spLocks noGrp="1"/>
+          </p:cNvSpPr>
+          <p:nvPr>
+            <p:ph type="body" idx="1"/>
+          </p:nvPr>
+        </p:nvSpPr>
+        <p:spPr>
+          <a:xfrm>
+            <a:off x="1724439" y="3112296"/>
+            <a:ext cx="6442364" cy="2438400"/>
+          </a:xfrm>
+          <a:prstGeom prst="rect">
+            <a:avLst/>
+          </a:prstGeom>
+        </p:spPr>
+        <p:txBody>
+          <a:bodyPr spcFirstLastPara="1" wrap="square" lIns="91425" tIns="91425" rIns="91425" bIns="91425" anchor="t" anchorCtr="0">
+            <a:noAutofit/>
+          </a:bodyPr>
+          <a:lstStyle/>
+          <a:p>
+            <a:pPr marL="0" lvl="0" indent="0" algn="ctr">
+              <a:buNone/>
+            </a:pPr>
+            <a:r>
+              <a:rPr lang="pt-BR" sz="2000" dirty="0"/>
+              <a:t>O resultado do estudo feito, mostra que a tecnologia afetou positivamente na auto confiança no parto, relação </a:t>
+            </a:r>
+            <a:r>
+              <a:rPr lang="pt-BR" sz="2000" dirty="0" smtClean="0"/>
+              <a:t>mãe-bebê e </a:t>
+            </a:r>
+            <a:r>
+              <a:rPr lang="pt-BR" sz="2000" dirty="0"/>
+              <a:t>segundo Nascimento (</a:t>
+            </a:r>
+            <a:r>
+              <a:rPr lang="pt-BR" sz="2000" dirty="0" smtClean="0"/>
+              <a:t>2011), tornando-se </a:t>
+            </a:r>
+            <a:r>
+              <a:rPr lang="pt-BR" sz="2000" dirty="0"/>
+              <a:t>mais preparadas e capacitadas no seu dia a dia. </a:t>
+            </a:r>
+            <a:endParaRPr sz="2000" dirty="0"/>
+          </a:p>
+        </p:txBody>
+      </p:sp>
+      <p:sp>
+        <p:nvSpPr>
+          <p:cNvPr id="135" name="Google Shape;135;p20"/>
+          <p:cNvSpPr txBox="1">
+            <a:spLocks noGrp="1"/>
+          </p:cNvSpPr>
+          <p:nvPr>
+            <p:ph type="sldNum" idx="12"/>
+          </p:nvPr>
+        </p:nvSpPr>
+        <p:spPr>
+          <a:xfrm>
+            <a:off x="533409" y="6061952"/>
+            <a:ext cx="548700" cy="525000"/>
+          </a:xfrm>
+          <a:prstGeom prst="rect">
+            <a:avLst/>
+          </a:prstGeom>
+        </p:spPr>
+        <p:txBody>
+          <a:bodyPr spcFirstLastPara="1" wrap="square" lIns="91425" tIns="91425" rIns="91425" bIns="91425" anchor="t" anchorCtr="0">
+            <a:noAutofit/>
+          </a:bodyPr>
+          <a:lstStyle/>
+          <a:p>
+            <a:pPr marL="0" lvl="0" indent="0" algn="l" rtl="0">
+              <a:spcBef>
+                <a:spcPts val="0"/>
+              </a:spcBef>
+              <a:spcAft>
+                <a:spcPts val="0"/>
+              </a:spcAft>
+              <a:buNone/>
+            </a:pPr>
+            <a:fld id="{00000000-1234-1234-1234-123412341234}" type="slidenum">
+              <a:rPr lang="en"/>
+              <a:t>10</a:t>
+            </a:fld>
+            <a:endParaRPr/>
+          </a:p>
+        </p:txBody>
+      </p:sp>
+    </p:spTree>
+    <p:extLst>
+      <p:ext uri="{BB962C8B-B14F-4D97-AF65-F5344CB8AC3E}">
+        <p14:creationId xmlns:p14="http://schemas.microsoft.com/office/powerpoint/2010/main" val="1183611099"/>
+      </p:ext>
+    </p:extLst>
+  </p:cSld>
+  <p:clrMapOvr>
+    <a:masterClrMapping/>
+  </p:clrMapOvr>
+  <p:timing>
+    <p:tnLst>
+      <p:par>
+        <p:cTn id="1" dur="indefinite" restart="never" nodeType="tmRoot"/>
+      </p:par>
+    </p:tnLst>
+  </p:timing>
+</p:sld>
+</file>
+
+<file path=ppt/slides/slide11.xml><?xml version="1.0" encoding="utf-8"?>
+<p:sld xmlns:a="http://schemas.openxmlformats.org/drawingml/2006/main" xmlns:r="http://schemas.openxmlformats.org/officeDocument/2006/relationships" xmlns:p="http://schemas.openxmlformats.org/presentationml/2006/main">
+  <p:cSld>
+    <p:spTree>
+      <p:nvGrpSpPr>
+        <p:cNvPr id="1" name="Shape 131"/>
+        <p:cNvGrpSpPr/>
+        <p:nvPr/>
+      </p:nvGrpSpPr>
+      <p:grpSpPr>
+        <a:xfrm>
+          <a:off x="0" y="0"/>
+          <a:ext cx="0" cy="0"/>
+          <a:chOff x="0" y="0"/>
+          <a:chExt cx="0" cy="0"/>
+        </a:xfrm>
+      </p:grpSpPr>
+      <p:sp>
+        <p:nvSpPr>
+          <p:cNvPr id="132" name="Google Shape;132;p20"/>
+          <p:cNvSpPr txBox="1">
+            <a:spLocks noGrp="1"/>
+          </p:cNvSpPr>
+          <p:nvPr>
+            <p:ph type="title"/>
+          </p:nvPr>
+        </p:nvSpPr>
+        <p:spPr>
+          <a:xfrm>
+            <a:off x="533400" y="533401"/>
+            <a:ext cx="2501348" cy="659296"/>
+          </a:xfrm>
+          <a:prstGeom prst="rect">
+            <a:avLst/>
+          </a:prstGeom>
+          <a:ln>
+            <a:solidFill>
+              <a:schemeClr val="tx1"/>
+            </a:solidFill>
+          </a:ln>
+        </p:spPr>
+        <p:txBody>
+          <a:bodyPr spcFirstLastPara="1" wrap="square" lIns="91425" tIns="91425" rIns="91425" bIns="91425" anchor="t" anchorCtr="0">
+            <a:noAutofit/>
+          </a:bodyPr>
+          <a:lstStyle/>
+          <a:p>
+            <a:pPr marL="0" lvl="0" indent="0" algn="ctr" rtl="0">
+              <a:spcBef>
+                <a:spcPts val="0"/>
+              </a:spcBef>
+              <a:spcAft>
+                <a:spcPts val="0"/>
+              </a:spcAft>
+              <a:buNone/>
+            </a:pPr>
+            <a:r>
+              <a:rPr lang="en" dirty="0" smtClean="0">
+                <a:solidFill>
+                  <a:schemeClr val="tx1"/>
+                </a:solidFill>
+              </a:rPr>
+              <a:t>Metodologia</a:t>
+            </a:r>
+            <a:endParaRPr dirty="0">
+              <a:solidFill>
+                <a:schemeClr val="tx1"/>
+              </a:solidFill>
+            </a:endParaRPr>
+          </a:p>
+        </p:txBody>
+      </p:sp>
+      <p:sp>
+        <p:nvSpPr>
+          <p:cNvPr id="133" name="Google Shape;133;p20"/>
+          <p:cNvSpPr txBox="1">
+            <a:spLocks noGrp="1"/>
+          </p:cNvSpPr>
+          <p:nvPr>
+            <p:ph type="body" idx="1"/>
+          </p:nvPr>
+        </p:nvSpPr>
+        <p:spPr>
+          <a:xfrm>
+            <a:off x="1724439" y="3191809"/>
+            <a:ext cx="6442364" cy="2438400"/>
+          </a:xfrm>
+          <a:prstGeom prst="rect">
+            <a:avLst/>
+          </a:prstGeom>
+        </p:spPr>
+        <p:txBody>
+          <a:bodyPr spcFirstLastPara="1" wrap="square" lIns="91425" tIns="91425" rIns="91425" bIns="91425" anchor="t" anchorCtr="0">
+            <a:noAutofit/>
+          </a:bodyPr>
+          <a:lstStyle/>
+          <a:p>
+            <a:pPr marL="0" lvl="0" indent="0" algn="ctr">
+              <a:buNone/>
+            </a:pPr>
+            <a:r>
+              <a:rPr lang="pt-BR" sz="2000" dirty="0"/>
+              <a:t>A pesquisa qualitativa que propomos será o desenvolvimento de um aplicativo na plataforma Android para clientes da empresa Dica de Lingerie, situada na cidade de </a:t>
+            </a:r>
+            <a:r>
+              <a:rPr lang="pt-BR" sz="2000" dirty="0" smtClean="0"/>
+              <a:t>Itaperuna-RJ.</a:t>
+            </a:r>
+            <a:endParaRPr sz="2000" dirty="0"/>
+          </a:p>
+        </p:txBody>
+      </p:sp>
+      <p:sp>
+        <p:nvSpPr>
+          <p:cNvPr id="135" name="Google Shape;135;p20"/>
+          <p:cNvSpPr txBox="1">
+            <a:spLocks noGrp="1"/>
+          </p:cNvSpPr>
+          <p:nvPr>
+            <p:ph type="sldNum" idx="12"/>
+          </p:nvPr>
+        </p:nvSpPr>
+        <p:spPr>
+          <a:xfrm>
+            <a:off x="533409" y="6061952"/>
+            <a:ext cx="548700" cy="525000"/>
+          </a:xfrm>
+          <a:prstGeom prst="rect">
+            <a:avLst/>
+          </a:prstGeom>
+        </p:spPr>
+        <p:txBody>
+          <a:bodyPr spcFirstLastPara="1" wrap="square" lIns="91425" tIns="91425" rIns="91425" bIns="91425" anchor="t" anchorCtr="0">
+            <a:noAutofit/>
+          </a:bodyPr>
+          <a:lstStyle/>
+          <a:p>
+            <a:pPr marL="0" lvl="0" indent="0" algn="l" rtl="0">
+              <a:spcBef>
+                <a:spcPts val="0"/>
+              </a:spcBef>
+              <a:spcAft>
+                <a:spcPts val="0"/>
+              </a:spcAft>
+              <a:buNone/>
+            </a:pPr>
+            <a:fld id="{00000000-1234-1234-1234-123412341234}" type="slidenum">
+              <a:rPr lang="en"/>
+              <a:t>11</a:t>
+            </a:fld>
+            <a:endParaRPr/>
+          </a:p>
+        </p:txBody>
+      </p:sp>
+    </p:spTree>
+    <p:extLst>
+      <p:ext uri="{BB962C8B-B14F-4D97-AF65-F5344CB8AC3E}">
+        <p14:creationId xmlns:p14="http://schemas.microsoft.com/office/powerpoint/2010/main" val="2789609010"/>
+      </p:ext>
+    </p:extLst>
+  </p:cSld>
+  <p:clrMapOvr>
+    <a:masterClrMapping/>
+  </p:clrMapOvr>
+  <p:timing>
+    <p:tnLst>
+      <p:par>
+        <p:cTn id="1" dur="indefinite" restart="never" nodeType="tmRoot"/>
+      </p:par>
+    </p:tnLst>
+  </p:timing>
+</p:sld>
+</file>
+
+<file path=ppt/slides/slide12.xml><?xml version="1.0" encoding="utf-8"?>
+<p:sld xmlns:a="http://schemas.openxmlformats.org/drawingml/2006/main" xmlns:r="http://schemas.openxmlformats.org/officeDocument/2006/relationships" xmlns:p="http://schemas.openxmlformats.org/presentationml/2006/main">
+  <p:cSld>
+    <p:spTree>
+      <p:nvGrpSpPr>
+        <p:cNvPr id="1" name="Shape 131"/>
+        <p:cNvGrpSpPr/>
+        <p:nvPr/>
+      </p:nvGrpSpPr>
+      <p:grpSpPr>
+        <a:xfrm>
+          <a:off x="0" y="0"/>
+          <a:ext cx="0" cy="0"/>
+          <a:chOff x="0" y="0"/>
+          <a:chExt cx="0" cy="0"/>
+        </a:xfrm>
+      </p:grpSpPr>
+      <p:sp>
+        <p:nvSpPr>
+          <p:cNvPr id="132" name="Google Shape;132;p20"/>
+          <p:cNvSpPr txBox="1">
+            <a:spLocks noGrp="1"/>
+          </p:cNvSpPr>
+          <p:nvPr>
+            <p:ph type="title"/>
+          </p:nvPr>
+        </p:nvSpPr>
+        <p:spPr>
+          <a:xfrm>
+            <a:off x="533400" y="533401"/>
+            <a:ext cx="2501348" cy="659296"/>
+          </a:xfrm>
+          <a:prstGeom prst="rect">
+            <a:avLst/>
+          </a:prstGeom>
+          <a:ln>
+            <a:solidFill>
+              <a:schemeClr val="tx1"/>
+            </a:solidFill>
+          </a:ln>
+        </p:spPr>
+        <p:txBody>
+          <a:bodyPr spcFirstLastPara="1" wrap="square" lIns="91425" tIns="91425" rIns="91425" bIns="91425" anchor="t" anchorCtr="0">
+            <a:noAutofit/>
+          </a:bodyPr>
+          <a:lstStyle/>
+          <a:p>
+            <a:pPr marL="0" lvl="0" indent="0" algn="ctr" rtl="0">
+              <a:spcBef>
+                <a:spcPts val="0"/>
+              </a:spcBef>
+              <a:spcAft>
+                <a:spcPts val="0"/>
+              </a:spcAft>
+              <a:buNone/>
+            </a:pPr>
+            <a:r>
+              <a:rPr lang="en" dirty="0" smtClean="0">
+                <a:solidFill>
+                  <a:schemeClr val="tx1"/>
+                </a:solidFill>
+              </a:rPr>
+              <a:t>Metodologia</a:t>
+            </a:r>
+            <a:endParaRPr dirty="0">
+              <a:solidFill>
+                <a:schemeClr val="tx1"/>
+              </a:solidFill>
+            </a:endParaRPr>
+          </a:p>
+        </p:txBody>
+      </p:sp>
+      <p:sp>
+        <p:nvSpPr>
+          <p:cNvPr id="133" name="Google Shape;133;p20"/>
+          <p:cNvSpPr txBox="1">
+            <a:spLocks noGrp="1"/>
+          </p:cNvSpPr>
+          <p:nvPr>
+            <p:ph type="body" idx="1"/>
+          </p:nvPr>
+        </p:nvSpPr>
+        <p:spPr>
+          <a:xfrm>
+            <a:off x="1724439" y="3191809"/>
+            <a:ext cx="6442364" cy="2438400"/>
+          </a:xfrm>
+          <a:prstGeom prst="rect">
+            <a:avLst/>
+          </a:prstGeom>
+        </p:spPr>
+        <p:txBody>
+          <a:bodyPr spcFirstLastPara="1" wrap="square" lIns="91425" tIns="91425" rIns="91425" bIns="91425" anchor="t" anchorCtr="0">
+            <a:noAutofit/>
+          </a:bodyPr>
+          <a:lstStyle/>
+          <a:p>
+            <a:pPr marL="0" lvl="0" indent="0" algn="ctr">
+              <a:buNone/>
+            </a:pPr>
+            <a:r>
+              <a:rPr lang="pt-BR" sz="2000" dirty="0"/>
+              <a:t>O trabalho de carácter descritivo tem por objetivo auxiliar um grupo de mulheres gestantes através do uso do aplicativo na plataforma Android, durante toda a fase gestacional proporcionando uma nova visão do problema. </a:t>
+            </a:r>
+            <a:endParaRPr sz="2000" dirty="0"/>
+          </a:p>
+        </p:txBody>
+      </p:sp>
+      <p:sp>
+        <p:nvSpPr>
+          <p:cNvPr id="135" name="Google Shape;135;p20"/>
+          <p:cNvSpPr txBox="1">
+            <a:spLocks noGrp="1"/>
+          </p:cNvSpPr>
+          <p:nvPr>
+            <p:ph type="sldNum" idx="12"/>
+          </p:nvPr>
+        </p:nvSpPr>
+        <p:spPr>
+          <a:xfrm>
+            <a:off x="533409" y="6061952"/>
+            <a:ext cx="548700" cy="525000"/>
+          </a:xfrm>
+          <a:prstGeom prst="rect">
+            <a:avLst/>
+          </a:prstGeom>
+        </p:spPr>
+        <p:txBody>
+          <a:bodyPr spcFirstLastPara="1" wrap="square" lIns="91425" tIns="91425" rIns="91425" bIns="91425" anchor="t" anchorCtr="0">
+            <a:noAutofit/>
+          </a:bodyPr>
+          <a:lstStyle/>
+          <a:p>
+            <a:pPr marL="0" lvl="0" indent="0" algn="l" rtl="0">
+              <a:spcBef>
+                <a:spcPts val="0"/>
+              </a:spcBef>
+              <a:spcAft>
+                <a:spcPts val="0"/>
+              </a:spcAft>
+              <a:buNone/>
+            </a:pPr>
+            <a:fld id="{00000000-1234-1234-1234-123412341234}" type="slidenum">
+              <a:rPr lang="en"/>
+              <a:t>12</a:t>
+            </a:fld>
+            <a:endParaRPr/>
+          </a:p>
+        </p:txBody>
+      </p:sp>
+    </p:spTree>
+    <p:extLst>
+      <p:ext uri="{BB962C8B-B14F-4D97-AF65-F5344CB8AC3E}">
+        <p14:creationId xmlns:p14="http://schemas.microsoft.com/office/powerpoint/2010/main" val="3563851483"/>
+      </p:ext>
+    </p:extLst>
+  </p:cSld>
+  <p:clrMapOvr>
+    <a:masterClrMapping/>
+  </p:clrMapOvr>
+  <p:timing>
+    <p:tnLst>
+      <p:par>
+        <p:cTn id="1" dur="indefinite" restart="never" nodeType="tmRoot"/>
+      </p:par>
+    </p:tnLst>
+  </p:timing>
+</p:sld>
+</file>
+
+<file path=ppt/slides/slide13.xml><?xml version="1.0" encoding="utf-8"?>
+<p:sld xmlns:a="http://schemas.openxmlformats.org/drawingml/2006/main" xmlns:r="http://schemas.openxmlformats.org/officeDocument/2006/relationships" xmlns:p="http://schemas.openxmlformats.org/presentationml/2006/main">
+  <p:cSld>
+    <p:spTree>
+      <p:nvGrpSpPr>
+        <p:cNvPr id="1" name="Shape 131"/>
+        <p:cNvGrpSpPr/>
+        <p:nvPr/>
+      </p:nvGrpSpPr>
+      <p:grpSpPr>
+        <a:xfrm>
+          <a:off x="0" y="0"/>
+          <a:ext cx="0" cy="0"/>
+          <a:chOff x="0" y="0"/>
+          <a:chExt cx="0" cy="0"/>
+        </a:xfrm>
+      </p:grpSpPr>
+      <p:sp>
+        <p:nvSpPr>
+          <p:cNvPr id="132" name="Google Shape;132;p20"/>
+          <p:cNvSpPr txBox="1">
+            <a:spLocks noGrp="1"/>
+          </p:cNvSpPr>
+          <p:nvPr>
+            <p:ph type="title"/>
+          </p:nvPr>
+        </p:nvSpPr>
+        <p:spPr>
+          <a:xfrm>
+            <a:off x="533409" y="715618"/>
+            <a:ext cx="2832653" cy="649356"/>
+          </a:xfrm>
+          <a:prstGeom prst="rect">
+            <a:avLst/>
+          </a:prstGeom>
+          <a:ln>
+            <a:solidFill>
+              <a:schemeClr val="tx1"/>
+            </a:solidFill>
+          </a:ln>
+        </p:spPr>
+        <p:txBody>
+          <a:bodyPr spcFirstLastPara="1" wrap="square" lIns="91425" tIns="91425" rIns="91425" bIns="91425" anchor="t" anchorCtr="0">
+            <a:noAutofit/>
+          </a:bodyPr>
+          <a:lstStyle/>
+          <a:p>
+            <a:pPr marL="0" lvl="0" indent="0" algn="ctr" rtl="0">
+              <a:spcBef>
+                <a:spcPts val="0"/>
+              </a:spcBef>
+              <a:spcAft>
+                <a:spcPts val="0"/>
+              </a:spcAft>
+              <a:buNone/>
+            </a:pPr>
+            <a:r>
+              <a:rPr lang="en" dirty="0" smtClean="0">
+                <a:solidFill>
+                  <a:schemeClr val="tx1"/>
+                </a:solidFill>
+              </a:rPr>
+              <a:t>Android Studio</a:t>
+            </a:r>
+            <a:endParaRPr dirty="0">
+              <a:solidFill>
+                <a:schemeClr val="tx1"/>
+              </a:solidFill>
+            </a:endParaRPr>
+          </a:p>
+        </p:txBody>
+      </p:sp>
+      <p:sp>
+        <p:nvSpPr>
+          <p:cNvPr id="133" name="Google Shape;133;p20"/>
+          <p:cNvSpPr txBox="1">
+            <a:spLocks noGrp="1"/>
+          </p:cNvSpPr>
+          <p:nvPr>
+            <p:ph type="body" idx="1"/>
+          </p:nvPr>
+        </p:nvSpPr>
+        <p:spPr>
+          <a:xfrm>
+            <a:off x="1724439" y="3191809"/>
+            <a:ext cx="6442364" cy="2438400"/>
+          </a:xfrm>
+          <a:prstGeom prst="rect">
+            <a:avLst/>
+          </a:prstGeom>
+        </p:spPr>
+        <p:txBody>
+          <a:bodyPr spcFirstLastPara="1" wrap="square" lIns="91425" tIns="91425" rIns="91425" bIns="91425" anchor="t" anchorCtr="0">
+            <a:noAutofit/>
+          </a:bodyPr>
+          <a:lstStyle/>
+          <a:p>
+            <a:pPr marL="0" lvl="0" indent="0" algn="ctr">
+              <a:buNone/>
+            </a:pPr>
+            <a:r>
+              <a:rPr lang="pt-BR" sz="2000" dirty="0"/>
+              <a:t>Segundo LECHETA (2009), o uso dessa plataforma </a:t>
+            </a:r>
+            <a:r>
+              <a:rPr lang="pt-BR" sz="2000" b="1" dirty="0"/>
+              <a:t>moderna</a:t>
+            </a:r>
+            <a:r>
+              <a:rPr lang="pt-BR" sz="2000" dirty="0"/>
+              <a:t> e </a:t>
+            </a:r>
+            <a:r>
+              <a:rPr lang="pt-BR" sz="2000" b="1" dirty="0"/>
+              <a:t>flexível</a:t>
+            </a:r>
+            <a:r>
+              <a:rPr lang="pt-BR" sz="2000" dirty="0"/>
+              <a:t> possibilita o desenvolvimento de aplicativos modernos e personalizados, além da facilidade e personalização das aplicações e componentes.</a:t>
+            </a:r>
+            <a:endParaRPr sz="2000" dirty="0"/>
+          </a:p>
+        </p:txBody>
+      </p:sp>
+      <p:sp>
+        <p:nvSpPr>
+          <p:cNvPr id="135" name="Google Shape;135;p20"/>
+          <p:cNvSpPr txBox="1">
+            <a:spLocks noGrp="1"/>
+          </p:cNvSpPr>
+          <p:nvPr>
+            <p:ph type="sldNum" idx="12"/>
+          </p:nvPr>
+        </p:nvSpPr>
+        <p:spPr>
+          <a:xfrm>
+            <a:off x="533409" y="6061952"/>
+            <a:ext cx="548700" cy="525000"/>
+          </a:xfrm>
+          <a:prstGeom prst="rect">
+            <a:avLst/>
+          </a:prstGeom>
+        </p:spPr>
+        <p:txBody>
+          <a:bodyPr spcFirstLastPara="1" wrap="square" lIns="91425" tIns="91425" rIns="91425" bIns="91425" anchor="t" anchorCtr="0">
+            <a:noAutofit/>
+          </a:bodyPr>
+          <a:lstStyle/>
+          <a:p>
+            <a:pPr marL="0" lvl="0" indent="0" algn="l" rtl="0">
+              <a:spcBef>
+                <a:spcPts val="0"/>
+              </a:spcBef>
+              <a:spcAft>
+                <a:spcPts val="0"/>
+              </a:spcAft>
+              <a:buNone/>
+            </a:pPr>
+            <a:fld id="{00000000-1234-1234-1234-123412341234}" type="slidenum">
+              <a:rPr lang="en"/>
+              <a:t>13</a:t>
+            </a:fld>
+            <a:endParaRPr/>
+          </a:p>
+        </p:txBody>
+      </p:sp>
+    </p:spTree>
+    <p:extLst>
+      <p:ext uri="{BB962C8B-B14F-4D97-AF65-F5344CB8AC3E}">
+        <p14:creationId xmlns:p14="http://schemas.microsoft.com/office/powerpoint/2010/main" val="1912368504"/>
+      </p:ext>
+    </p:extLst>
+  </p:cSld>
+  <p:clrMapOvr>
+    <a:masterClrMapping/>
+  </p:clrMapOvr>
+  <p:timing>
+    <p:tnLst>
+      <p:par>
+        <p:cTn id="1" dur="indefinite" restart="never" nodeType="tmRoot"/>
+      </p:par>
+    </p:tnLst>
+  </p:timing>
+</p:sld>
+</file>
+
+<file path=ppt/slides/slide14.xml><?xml version="1.0" encoding="utf-8"?>
+<p:sld xmlns:a="http://schemas.openxmlformats.org/drawingml/2006/main" xmlns:r="http://schemas.openxmlformats.org/officeDocument/2006/relationships" xmlns:p="http://schemas.openxmlformats.org/presentationml/2006/main">
+  <p:cSld>
+    <p:spTree>
+      <p:nvGrpSpPr>
         <p:cNvPr id="1" name="Shape 98"/>
         <p:cNvGrpSpPr/>
         <p:nvPr/>
@@ -5392,7 +6759,7 @@
           <a:noFill/>
           <a:ln w="76200" cap="flat" cmpd="sng">
             <a:solidFill>
-              <a:srgbClr val="FF0000"/>
+              <a:schemeClr val="tx1"/>
             </a:solidFill>
             <a:prstDash val="solid"/>
             <a:miter lim="8000"/>
@@ -5578,7 +6945,7 @@
             </a:pPr>
             <a:fld id="{00000000-1234-1234-1234-123412341234}" type="slidenum">
               <a:rPr lang="en"/>
-              <a:t>10</a:t>
+              <a:t>14</a:t>
             </a:fld>
             <a:endParaRPr/>
           </a:p>
@@ -5640,7 +7007,7 @@
 </p:sld>
 </file>
 
-<file path=ppt/slides/slide11.xml><?xml version="1.0" encoding="utf-8"?>
+<file path=ppt/slides/slide15.xml><?xml version="1.0" encoding="utf-8"?>
 <p:sld xmlns:a="http://schemas.openxmlformats.org/drawingml/2006/main" xmlns:r="http://schemas.openxmlformats.org/officeDocument/2006/relationships" xmlns:p="http://schemas.openxmlformats.org/presentationml/2006/main">
   <p:cSld>
     <p:spTree>
@@ -5674,7 +7041,7 @@
           <a:noFill/>
           <a:ln w="76200" cap="flat" cmpd="sng">
             <a:solidFill>
-              <a:srgbClr val="FF0000"/>
+              <a:schemeClr val="tx1"/>
             </a:solidFill>
             <a:prstDash val="solid"/>
             <a:miter lim="8000"/>
@@ -5891,7 +7258,7 @@
             </a:pPr>
             <a:fld id="{00000000-1234-1234-1234-123412341234}" type="slidenum">
               <a:rPr lang="en"/>
-              <a:t>11</a:t>
+              <a:t>15</a:t>
             </a:fld>
             <a:endParaRPr/>
           </a:p>
@@ -5940,7 +7307,7 @@
 </p:sld>
 </file>
 
-<file path=ppt/slides/slide12.xml><?xml version="1.0" encoding="utf-8"?>
+<file path=ppt/slides/slide16.xml><?xml version="1.0" encoding="utf-8"?>
 <p:sld xmlns:a="http://schemas.openxmlformats.org/drawingml/2006/main" xmlns:r="http://schemas.openxmlformats.org/officeDocument/2006/relationships" xmlns:p="http://schemas.openxmlformats.org/presentationml/2006/main">
   <p:cSld>
     <p:spTree>
@@ -5974,7 +7341,7 @@
           <a:noFill/>
           <a:ln w="76200" cap="flat" cmpd="sng">
             <a:solidFill>
-              <a:srgbClr val="FF0000"/>
+              <a:schemeClr val="tx1"/>
             </a:solidFill>
             <a:prstDash val="solid"/>
             <a:miter lim="8000"/>
@@ -6132,7 +7499,7 @@
             </a:pPr>
             <a:fld id="{00000000-1234-1234-1234-123412341234}" type="slidenum">
               <a:rPr lang="en"/>
-              <a:t>12</a:t>
+              <a:t>16</a:t>
             </a:fld>
             <a:endParaRPr/>
           </a:p>
@@ -6197,7 +7564,7 @@
 </p:sld>
 </file>
 
-<file path=ppt/slides/slide13.xml><?xml version="1.0" encoding="utf-8"?>
+<file path=ppt/slides/slide17.xml><?xml version="1.0" encoding="utf-8"?>
 <p:sld xmlns:a="http://schemas.openxmlformats.org/drawingml/2006/main" xmlns:r="http://schemas.openxmlformats.org/officeDocument/2006/relationships" xmlns:p="http://schemas.openxmlformats.org/presentationml/2006/main">
   <p:cSld>
     <p:spTree>
@@ -6231,7 +7598,7 @@
           <a:noFill/>
           <a:ln w="76200" cap="flat" cmpd="sng">
             <a:solidFill>
-              <a:srgbClr val="FF0000"/>
+              <a:schemeClr val="tx1"/>
             </a:solidFill>
             <a:prstDash val="solid"/>
             <a:miter lim="8000"/>
@@ -6417,7 +7784,7 @@
             </a:pPr>
             <a:fld id="{00000000-1234-1234-1234-123412341234}" type="slidenum">
               <a:rPr lang="en"/>
-              <a:t>13</a:t>
+              <a:t>17</a:t>
             </a:fld>
             <a:endParaRPr/>
           </a:p>
@@ -6466,7 +7833,7 @@
 </p:sld>
 </file>
 
-<file path=ppt/slides/slide14.xml><?xml version="1.0" encoding="utf-8"?>
+<file path=ppt/slides/slide18.xml><?xml version="1.0" encoding="utf-8"?>
 <p:sld xmlns:a="http://schemas.openxmlformats.org/drawingml/2006/main" xmlns:r="http://schemas.openxmlformats.org/officeDocument/2006/relationships" xmlns:p="http://schemas.openxmlformats.org/presentationml/2006/main">
   <p:cSld>
     <p:spTree>
@@ -6501,6 +7868,11 @@
           <a:prstGeom prst="rect">
             <a:avLst/>
           </a:prstGeom>
+          <a:ln>
+            <a:solidFill>
+              <a:schemeClr val="tx1"/>
+            </a:solidFill>
+          </a:ln>
         </p:spPr>
         <p:txBody>
           <a:bodyPr spcFirstLastPara="1" wrap="square" lIns="91425" tIns="91425" rIns="91425" bIns="91425" anchor="t" anchorCtr="0">
@@ -6579,7 +7951,15 @@
             </a:r>
             <a:r>
               <a:rPr lang="pt-BR" sz="2000" dirty="0"/>
-              <a:t> que visa disponibilizar conteúdos e </a:t>
+              <a:t> que visa disponibilizar </a:t>
+            </a:r>
+            <a:r>
+              <a:rPr lang="pt-BR" sz="2000" b="1" u="sng" dirty="0"/>
+              <a:t>conteúdos</a:t>
+            </a:r>
+            <a:r>
+              <a:rPr lang="pt-BR" sz="2000" dirty="0"/>
+              <a:t> e </a:t>
             </a:r>
             <a:r>
               <a:rPr lang="pt-BR" sz="2000" b="1" u="sng" dirty="0"/>
@@ -6656,7 +8036,7 @@
             </a:pPr>
             <a:fld id="{00000000-1234-1234-1234-123412341234}" type="slidenum">
               <a:rPr lang="en"/>
-              <a:t>14</a:t>
+              <a:t>18</a:t>
             </a:fld>
             <a:endParaRPr/>
           </a:p>
@@ -6720,7 +8100,7 @@
 </p:sld>
 </file>
 
-<file path=ppt/slides/slide15.xml><?xml version="1.0" encoding="utf-8"?>
+<file path=ppt/slides/slide19.xml><?xml version="1.0" encoding="utf-8"?>
 <p:sld xmlns:a="http://schemas.openxmlformats.org/drawingml/2006/main" xmlns:r="http://schemas.openxmlformats.org/officeDocument/2006/relationships" xmlns:p="http://schemas.openxmlformats.org/presentationml/2006/main">
   <p:cSld>
     <p:spTree>
@@ -6755,6 +8135,11 @@
           <a:prstGeom prst="rect">
             <a:avLst/>
           </a:prstGeom>
+          <a:ln>
+            <a:solidFill>
+              <a:schemeClr val="tx1"/>
+            </a:solidFill>
+          </a:ln>
         </p:spPr>
         <p:txBody>
           <a:bodyPr spcFirstLastPara="1" wrap="square" lIns="91425" tIns="91425" rIns="91425" bIns="91425" anchor="t" anchorCtr="0">
@@ -6799,8 +8184,8 @@
         </p:nvSpPr>
         <p:spPr>
           <a:xfrm>
-            <a:off x="3368042" y="1445598"/>
-            <a:ext cx="4682100" cy="1653900"/>
+            <a:off x="3087757" y="1445598"/>
+            <a:ext cx="4962385" cy="1653900"/>
           </a:xfrm>
           <a:prstGeom prst="rect">
             <a:avLst/>
@@ -6825,7 +8210,15 @@
             </a:r>
             <a:r>
               <a:rPr lang="pt-BR" sz="2000" dirty="0"/>
-              <a:t>, garantindo que mães possam se relacionar através da </a:t>
+              <a:t>, garantindo que </a:t>
+            </a:r>
+            <a:r>
+              <a:rPr lang="pt-BR" sz="2000" dirty="0" smtClean="0"/>
+              <a:t>mulheres </a:t>
+            </a:r>
+            <a:r>
+              <a:rPr lang="pt-BR" sz="2000" dirty="0"/>
+              <a:t>possam se relacionar através da </a:t>
             </a:r>
             <a:r>
               <a:rPr lang="pt-BR" sz="2000" b="1" dirty="0"/>
@@ -6883,7 +8276,7 @@
             </a:pPr>
             <a:fld id="{00000000-1234-1234-1234-123412341234}" type="slidenum">
               <a:rPr lang="en"/>
-              <a:t>15</a:t>
+              <a:t>19</a:t>
             </a:fld>
             <a:endParaRPr/>
           </a:p>
@@ -6985,784 +8378,6 @@
         <p14:creationId xmlns:p14="http://schemas.microsoft.com/office/powerpoint/2010/main" val="1650033589"/>
       </p:ext>
     </p:extLst>
-  </p:cSld>
-  <p:clrMapOvr>
-    <a:masterClrMapping/>
-  </p:clrMapOvr>
-  <p:timing>
-    <p:tnLst>
-      <p:par>
-        <p:cTn id="1" dur="indefinite" restart="never" nodeType="tmRoot"/>
-      </p:par>
-    </p:tnLst>
-  </p:timing>
-</p:sld>
-</file>
-
-<file path=ppt/slides/slide16.xml><?xml version="1.0" encoding="utf-8"?>
-<p:sld xmlns:a="http://schemas.openxmlformats.org/drawingml/2006/main" xmlns:r="http://schemas.openxmlformats.org/officeDocument/2006/relationships" xmlns:p="http://schemas.openxmlformats.org/presentationml/2006/main">
-  <p:cSld>
-    <p:spTree>
-      <p:nvGrpSpPr>
-        <p:cNvPr id="1" name="Shape 131"/>
-        <p:cNvGrpSpPr/>
-        <p:nvPr/>
-      </p:nvGrpSpPr>
-      <p:grpSpPr>
-        <a:xfrm>
-          <a:off x="0" y="0"/>
-          <a:ext cx="0" cy="0"/>
-          <a:chOff x="0" y="0"/>
-          <a:chExt cx="0" cy="0"/>
-        </a:xfrm>
-      </p:grpSpPr>
-      <p:sp>
-        <p:nvSpPr>
-          <p:cNvPr id="132" name="Google Shape;132;p20"/>
-          <p:cNvSpPr txBox="1">
-            <a:spLocks noGrp="1"/>
-          </p:cNvSpPr>
-          <p:nvPr>
-            <p:ph type="title"/>
-          </p:nvPr>
-        </p:nvSpPr>
-        <p:spPr>
-          <a:xfrm>
-            <a:off x="533409" y="500825"/>
-            <a:ext cx="2077278" cy="958025"/>
-          </a:xfrm>
-          <a:prstGeom prst="rect">
-            <a:avLst/>
-          </a:prstGeom>
-        </p:spPr>
-        <p:txBody>
-          <a:bodyPr spcFirstLastPara="1" wrap="square" lIns="91425" tIns="91425" rIns="91425" bIns="91425" anchor="t" anchorCtr="0">
-            <a:noAutofit/>
-          </a:bodyPr>
-          <a:lstStyle/>
-          <a:p>
-            <a:pPr marL="0" lvl="0" indent="0" algn="ctr" rtl="0">
-              <a:spcBef>
-                <a:spcPts val="0"/>
-              </a:spcBef>
-              <a:spcAft>
-                <a:spcPts val="0"/>
-              </a:spcAft>
-              <a:buNone/>
-            </a:pPr>
-            <a:r>
-              <a:rPr lang="en" dirty="0" smtClean="0">
-                <a:solidFill>
-                  <a:schemeClr val="tx1"/>
-                </a:solidFill>
-              </a:rPr>
-              <a:t>Referências</a:t>
-            </a:r>
-            <a:endParaRPr dirty="0">
-              <a:solidFill>
-                <a:schemeClr val="tx1"/>
-              </a:solidFill>
-            </a:endParaRPr>
-          </a:p>
-        </p:txBody>
-      </p:sp>
-      <p:sp>
-        <p:nvSpPr>
-          <p:cNvPr id="133" name="Google Shape;133;p20"/>
-          <p:cNvSpPr txBox="1">
-            <a:spLocks noGrp="1"/>
-          </p:cNvSpPr>
-          <p:nvPr>
-            <p:ph type="body" idx="1"/>
-          </p:nvPr>
-        </p:nvSpPr>
-        <p:spPr>
-          <a:xfrm>
-            <a:off x="1082109" y="1700243"/>
-            <a:ext cx="7601928" cy="4886709"/>
-          </a:xfrm>
-          <a:prstGeom prst="rect">
-            <a:avLst/>
-          </a:prstGeom>
-        </p:spPr>
-        <p:txBody>
-          <a:bodyPr spcFirstLastPara="1" wrap="square" lIns="91425" tIns="91425" rIns="91425" bIns="91425" anchor="t" anchorCtr="0">
-            <a:noAutofit/>
-          </a:bodyPr>
-          <a:lstStyle/>
-          <a:p>
-            <a:pPr algn="just"/>
-            <a:r>
-              <a:rPr lang="pt-BR" sz="1200" dirty="0"/>
-              <a:t>SILVA, Laura </a:t>
-            </a:r>
-            <a:r>
-              <a:rPr lang="pt-BR" sz="1200" dirty="0" err="1"/>
-              <a:t>Johanson</a:t>
-            </a:r>
-            <a:r>
-              <a:rPr lang="pt-BR" sz="1200" dirty="0"/>
-              <a:t> da; SILVA, Leila Rangel da. Mudanças na vida e no corpo: vivências diante da gravidez na perspectiva afetiva dos pais. Esc. Anna Nery, Rio de Janeiro , v. 13, n. 2, p. 393-401, </a:t>
-            </a:r>
-            <a:r>
-              <a:rPr lang="pt-BR" sz="1200" dirty="0" err="1"/>
-              <a:t>June</a:t>
-            </a:r>
-            <a:r>
-              <a:rPr lang="pt-BR" sz="1200" dirty="0"/>
-              <a:t> 2009 . </a:t>
-            </a:r>
-            <a:r>
-              <a:rPr lang="pt-BR" sz="1200" dirty="0" err="1"/>
-              <a:t>Available</a:t>
-            </a:r>
-            <a:r>
-              <a:rPr lang="pt-BR" sz="1200" dirty="0"/>
-              <a:t> </a:t>
-            </a:r>
-            <a:r>
-              <a:rPr lang="pt-BR" sz="1200" dirty="0" err="1"/>
-              <a:t>from</a:t>
-            </a:r>
-            <a:r>
-              <a:rPr lang="pt-BR" sz="1200" dirty="0"/>
-              <a:t> </a:t>
-            </a:r>
-            <a:r>
-              <a:rPr lang="pt-BR" sz="1200" dirty="0">
-                <a:hlinkClick r:id="rId3"/>
-              </a:rPr>
-              <a:t>http://www.scielo.br/scielo.php?script=sci_arttext&amp;pid=S1414-81452009000200022&amp;lng=en&amp;nrm=iso</a:t>
-            </a:r>
-            <a:r>
-              <a:rPr lang="pt-BR" sz="1200" dirty="0"/>
-              <a:t>. </a:t>
-            </a:r>
-            <a:r>
-              <a:rPr lang="pt-BR" sz="1200" dirty="0" err="1"/>
-              <a:t>access</a:t>
-            </a:r>
-            <a:r>
-              <a:rPr lang="pt-BR" sz="1200" dirty="0"/>
-              <a:t> </a:t>
-            </a:r>
-            <a:r>
-              <a:rPr lang="pt-BR" sz="1200" dirty="0" err="1"/>
-              <a:t>on</a:t>
-            </a:r>
-            <a:r>
-              <a:rPr lang="pt-BR" sz="1200" dirty="0"/>
-              <a:t> 26 de setembro 2018. </a:t>
-            </a:r>
-            <a:r>
-              <a:rPr lang="pt-BR" sz="1200" dirty="0">
-                <a:hlinkClick r:id="rId4"/>
-              </a:rPr>
-              <a:t>http://dx.doi.org/10.1590/S1414-81452009000200022</a:t>
-            </a:r>
-            <a:r>
-              <a:rPr lang="pt-BR" sz="1200" dirty="0"/>
-              <a:t>.</a:t>
-            </a:r>
-          </a:p>
-          <a:p>
-            <a:pPr algn="just"/>
-            <a:r>
-              <a:rPr lang="pt-BR" sz="1200" dirty="0"/>
-              <a:t>MELO, Luciana de </a:t>
-            </a:r>
-            <a:r>
-              <a:rPr lang="pt-BR" sz="1200" dirty="0" err="1"/>
-              <a:t>Lione</a:t>
-            </a:r>
-            <a:r>
-              <a:rPr lang="pt-BR" sz="1200" dirty="0"/>
-              <a:t>; LIMA, Maria Alice Dias da Silva. Mulheres no segundo e terceiro trimestres de gravidez: suas alterações psicológicas. Rev. bras. </a:t>
-            </a:r>
-            <a:r>
-              <a:rPr lang="pt-BR" sz="1200" dirty="0" err="1"/>
-              <a:t>enferm</a:t>
-            </a:r>
-            <a:r>
-              <a:rPr lang="pt-BR" sz="1200" dirty="0"/>
-              <a:t>., Brasília , v. 53, n. 1, p. 81-86, Mar. 2000 . </a:t>
-            </a:r>
-            <a:r>
-              <a:rPr lang="pt-BR" sz="1200" dirty="0" err="1"/>
-              <a:t>Available</a:t>
-            </a:r>
-            <a:r>
-              <a:rPr lang="pt-BR" sz="1200" dirty="0"/>
-              <a:t> </a:t>
-            </a:r>
-            <a:r>
-              <a:rPr lang="pt-BR" sz="1200" dirty="0" err="1"/>
-              <a:t>from</a:t>
-            </a:r>
-            <a:r>
-              <a:rPr lang="pt-BR" sz="1200" dirty="0"/>
-              <a:t> </a:t>
-            </a:r>
-            <a:r>
-              <a:rPr lang="pt-BR" sz="1200" dirty="0">
-                <a:hlinkClick r:id="rId5"/>
-              </a:rPr>
-              <a:t>http://www.scielo.br/scielo.php?script=sci_arttext&amp;pid=S0034-71672000000100010&amp;lng=en&amp;nrm=iso</a:t>
-            </a:r>
-            <a:r>
-              <a:rPr lang="pt-BR" sz="1200" dirty="0"/>
-              <a:t>. </a:t>
-            </a:r>
-            <a:r>
-              <a:rPr lang="pt-BR" sz="1200" dirty="0" err="1"/>
-              <a:t>access</a:t>
-            </a:r>
-            <a:r>
-              <a:rPr lang="pt-BR" sz="1200" dirty="0"/>
-              <a:t> </a:t>
-            </a:r>
-            <a:r>
-              <a:rPr lang="pt-BR" sz="1200" dirty="0" err="1"/>
-              <a:t>on</a:t>
-            </a:r>
-            <a:r>
-              <a:rPr lang="pt-BR" sz="1200" dirty="0"/>
-              <a:t> 26 de setembro 2018. </a:t>
-            </a:r>
-            <a:r>
-              <a:rPr lang="pt-BR" sz="1200" dirty="0">
-                <a:hlinkClick r:id="rId6"/>
-              </a:rPr>
-              <a:t>http://dx.doi.org/10.1590/S0034-71672000000100010</a:t>
-            </a:r>
-            <a:r>
-              <a:rPr lang="pt-BR" sz="1200" dirty="0"/>
-              <a:t>.</a:t>
-            </a:r>
-          </a:p>
-          <a:p>
-            <a:pPr algn="just"/>
-            <a:r>
-              <a:rPr lang="pt-BR" sz="1200" dirty="0"/>
-              <a:t>FREITAS, G.L. et al. Discutindo a política à saúde da mulher no contexto da promoção da saúde. </a:t>
-            </a:r>
-            <a:r>
-              <a:rPr lang="pt-BR" sz="1200" dirty="0" err="1"/>
-              <a:t>Tev</a:t>
-            </a:r>
-            <a:r>
-              <a:rPr lang="pt-BR" sz="1200" dirty="0"/>
-              <a:t>. Eletr. </a:t>
-            </a:r>
-            <a:r>
-              <a:rPr lang="pt-BR" sz="1200" dirty="0" err="1"/>
-              <a:t>Enferm</a:t>
-            </a:r>
-            <a:r>
-              <a:rPr lang="pt-BR" sz="1200" dirty="0"/>
-              <a:t>., Goiânia, v.11, n.2, p.424-428, 2009).</a:t>
-            </a:r>
-          </a:p>
-          <a:p>
-            <a:pPr algn="just"/>
-            <a:r>
-              <a:rPr lang="pt-BR" sz="1200" dirty="0"/>
-              <a:t>NASCIMENTO, Natália Magalhães do et al . Tecnologias não invasivas de cuidado no parto realizadas por enfermeiras: a percepção de mulheres. Esc. Anna Nery, Rio de Janeiro , v. 14, n. 3, p. 456-461, </a:t>
-            </a:r>
-            <a:r>
-              <a:rPr lang="pt-BR" sz="1200" dirty="0" err="1"/>
-              <a:t>Sept</a:t>
-            </a:r>
-            <a:r>
-              <a:rPr lang="pt-BR" sz="1200" dirty="0"/>
-              <a:t>. 2010 . </a:t>
-            </a:r>
-            <a:r>
-              <a:rPr lang="pt-BR" sz="1200" dirty="0" err="1"/>
-              <a:t>Available</a:t>
-            </a:r>
-            <a:r>
-              <a:rPr lang="pt-BR" sz="1200" dirty="0"/>
-              <a:t> </a:t>
-            </a:r>
-            <a:r>
-              <a:rPr lang="pt-BR" sz="1200" dirty="0" err="1"/>
-              <a:t>from</a:t>
-            </a:r>
-            <a:r>
-              <a:rPr lang="pt-BR" sz="1200" dirty="0"/>
-              <a:t> </a:t>
-            </a:r>
-            <a:r>
-              <a:rPr lang="pt-BR" sz="1200" dirty="0">
-                <a:hlinkClick r:id="rId7"/>
-              </a:rPr>
-              <a:t>http://www.scielo.br/scielo.php?script=sci_arttext&amp;pid=S1414-81452010000300004&amp;lng=en&amp;nrm=iso</a:t>
-            </a:r>
-            <a:r>
-              <a:rPr lang="pt-BR" sz="1200" dirty="0"/>
-              <a:t>. </a:t>
-            </a:r>
-            <a:r>
-              <a:rPr lang="pt-BR" sz="1200" dirty="0" err="1"/>
-              <a:t>access</a:t>
-            </a:r>
-            <a:r>
-              <a:rPr lang="pt-BR" sz="1200" dirty="0"/>
-              <a:t> </a:t>
-            </a:r>
-            <a:r>
-              <a:rPr lang="pt-BR" sz="1200" dirty="0" err="1"/>
-              <a:t>on</a:t>
-            </a:r>
-            <a:r>
-              <a:rPr lang="pt-BR" sz="1200" dirty="0"/>
-              <a:t> 10 de agosto 2018. </a:t>
-            </a:r>
-            <a:r>
-              <a:rPr lang="pt-BR" sz="1200" dirty="0">
-                <a:hlinkClick r:id="rId8"/>
-              </a:rPr>
-              <a:t>http://dx.doi.org/10.1590/S1414-81452010000300004</a:t>
-            </a:r>
-            <a:r>
-              <a:rPr lang="pt-BR" sz="1200" dirty="0" smtClean="0"/>
-              <a:t>.</a:t>
-            </a:r>
-          </a:p>
-          <a:p>
-            <a:pPr algn="just"/>
-            <a:r>
-              <a:rPr lang="pt-BR" sz="1200" i="1" dirty="0" smtClean="0"/>
-              <a:t>Descubra 8 </a:t>
-            </a:r>
-            <a:r>
-              <a:rPr lang="pt-BR" sz="1200" i="1" dirty="0"/>
-              <a:t>aplicativos feitos para as grávidas</a:t>
-            </a:r>
-            <a:r>
-              <a:rPr lang="pt-BR" sz="1200" i="1" dirty="0" smtClean="0"/>
-              <a:t>!. </a:t>
-            </a:r>
-            <a:r>
-              <a:rPr lang="pt-BR" sz="1200" dirty="0" smtClean="0"/>
-              <a:t>Disponível em &lt;</a:t>
-            </a:r>
-            <a:r>
-              <a:rPr lang="pt-BR" sz="1200" dirty="0" smtClean="0">
-                <a:hlinkClick r:id="rId9"/>
-              </a:rPr>
-              <a:t>http</a:t>
-            </a:r>
-            <a:r>
-              <a:rPr lang="pt-BR" sz="1200" dirty="0">
-                <a:hlinkClick r:id="rId9"/>
-              </a:rPr>
-              <a:t>://www.cordvida.com.br/blog/descubra-8-aplicativos-feitos-para-as-gravidas</a:t>
-            </a:r>
-            <a:r>
-              <a:rPr lang="pt-BR" sz="1200" dirty="0" smtClean="0">
-                <a:hlinkClick r:id="rId9"/>
-              </a:rPr>
-              <a:t>/</a:t>
-            </a:r>
-            <a:r>
-              <a:rPr lang="pt-BR" sz="1200" dirty="0" smtClean="0"/>
-              <a:t>&gt;. Acesso em:  15 de outubro de 2018.</a:t>
-            </a:r>
-          </a:p>
-          <a:p>
-            <a:pPr algn="just"/>
-            <a:r>
-              <a:rPr lang="pt-BR" sz="1200" i="1" dirty="0"/>
-              <a:t>Os 7 melhores </a:t>
-            </a:r>
-            <a:r>
-              <a:rPr lang="pt-BR" sz="1200" i="1" dirty="0" err="1"/>
-              <a:t>apps</a:t>
-            </a:r>
-            <a:r>
-              <a:rPr lang="pt-BR" sz="1200" i="1" dirty="0"/>
-              <a:t> para grávidas – Tudo que você precisa durante a gravidez</a:t>
-            </a:r>
-            <a:r>
-              <a:rPr lang="pt-BR" sz="1200" i="1" dirty="0" smtClean="0"/>
-              <a:t>!. </a:t>
-            </a:r>
-            <a:r>
-              <a:rPr lang="pt-BR" sz="1200" dirty="0" smtClean="0"/>
-              <a:t>Disponível em: &lt;</a:t>
-            </a:r>
-            <a:r>
-              <a:rPr lang="pt-BR" sz="1200" dirty="0" smtClean="0">
-                <a:hlinkClick r:id="rId10"/>
-              </a:rPr>
-              <a:t>https</a:t>
-            </a:r>
-            <a:r>
-              <a:rPr lang="pt-BR" sz="1200" dirty="0">
-                <a:hlinkClick r:id="rId10"/>
-              </a:rPr>
-              <a:t>://www.soumae.org/os-4-melhores-apps-para-gravidas</a:t>
-            </a:r>
-            <a:r>
-              <a:rPr lang="pt-BR" sz="1200" dirty="0" smtClean="0">
-                <a:hlinkClick r:id="rId10"/>
-              </a:rPr>
-              <a:t>/</a:t>
-            </a:r>
-            <a:r>
-              <a:rPr lang="pt-BR" sz="1200" dirty="0" smtClean="0"/>
-              <a:t>&gt;. Acesso em: 15 de </a:t>
-            </a:r>
-            <a:r>
-              <a:rPr lang="pt-BR" sz="1200" dirty="0" err="1" smtClean="0"/>
-              <a:t>oubro</a:t>
-            </a:r>
-            <a:r>
-              <a:rPr lang="pt-BR" sz="1200" dirty="0" smtClean="0"/>
-              <a:t> de 2018.</a:t>
-            </a:r>
-          </a:p>
-          <a:p>
-            <a:pPr algn="just"/>
-            <a:endParaRPr lang="pt-BR" sz="1200" dirty="0" smtClean="0"/>
-          </a:p>
-          <a:p>
-            <a:pPr algn="just"/>
-            <a:endParaRPr lang="pt-BR" sz="1200" dirty="0"/>
-          </a:p>
-        </p:txBody>
-      </p:sp>
-      <p:sp>
-        <p:nvSpPr>
-          <p:cNvPr id="135" name="Google Shape;135;p20"/>
-          <p:cNvSpPr txBox="1">
-            <a:spLocks noGrp="1"/>
-          </p:cNvSpPr>
-          <p:nvPr>
-            <p:ph type="sldNum" idx="12"/>
-          </p:nvPr>
-        </p:nvSpPr>
-        <p:spPr>
-          <a:xfrm>
-            <a:off x="533409" y="6061952"/>
-            <a:ext cx="548700" cy="525000"/>
-          </a:xfrm>
-          <a:prstGeom prst="rect">
-            <a:avLst/>
-          </a:prstGeom>
-        </p:spPr>
-        <p:txBody>
-          <a:bodyPr spcFirstLastPara="1" wrap="square" lIns="91425" tIns="91425" rIns="91425" bIns="91425" anchor="t" anchorCtr="0">
-            <a:noAutofit/>
-          </a:bodyPr>
-          <a:lstStyle/>
-          <a:p>
-            <a:pPr marL="0" lvl="0" indent="0" algn="l" rtl="0">
-              <a:spcBef>
-                <a:spcPts val="0"/>
-              </a:spcBef>
-              <a:spcAft>
-                <a:spcPts val="0"/>
-              </a:spcAft>
-              <a:buNone/>
-            </a:pPr>
-            <a:fld id="{00000000-1234-1234-1234-123412341234}" type="slidenum">
-              <a:rPr lang="en"/>
-              <a:t>16</a:t>
-            </a:fld>
-            <a:endParaRPr/>
-          </a:p>
-        </p:txBody>
-      </p:sp>
-    </p:spTree>
-    <p:extLst>
-      <p:ext uri="{BB962C8B-B14F-4D97-AF65-F5344CB8AC3E}">
-        <p14:creationId xmlns:p14="http://schemas.microsoft.com/office/powerpoint/2010/main" val="1113655687"/>
-      </p:ext>
-    </p:extLst>
-  </p:cSld>
-  <p:clrMapOvr>
-    <a:masterClrMapping/>
-  </p:clrMapOvr>
-  <p:timing>
-    <p:tnLst>
-      <p:par>
-        <p:cTn id="1" dur="indefinite" restart="never" nodeType="tmRoot"/>
-      </p:par>
-    </p:tnLst>
-  </p:timing>
-</p:sld>
-</file>
-
-<file path=ppt/slides/slide17.xml><?xml version="1.0" encoding="utf-8"?>
-<p:sld xmlns:a="http://schemas.openxmlformats.org/drawingml/2006/main" xmlns:r="http://schemas.openxmlformats.org/officeDocument/2006/relationships" xmlns:p="http://schemas.openxmlformats.org/presentationml/2006/main">
-  <p:cSld>
-    <p:bg>
-      <p:bgPr>
-        <a:solidFill>
-          <a:srgbClr val="EFEFEF"/>
-        </a:solidFill>
-        <a:effectLst/>
-      </p:bgPr>
-    </p:bg>
-    <p:spTree>
-      <p:nvGrpSpPr>
-        <p:cNvPr id="1" name="Shape 778"/>
-        <p:cNvGrpSpPr/>
-        <p:nvPr/>
-      </p:nvGrpSpPr>
-      <p:grpSpPr>
-        <a:xfrm>
-          <a:off x="0" y="0"/>
-          <a:ext cx="0" cy="0"/>
-          <a:chOff x="0" y="0"/>
-          <a:chExt cx="0" cy="0"/>
-        </a:xfrm>
-      </p:grpSpPr>
-      <p:sp>
-        <p:nvSpPr>
-          <p:cNvPr id="779" name="Google Shape;779;p38"/>
-          <p:cNvSpPr txBox="1"/>
-          <p:nvPr/>
-        </p:nvSpPr>
-        <p:spPr>
-          <a:xfrm>
-            <a:off x="1939128" y="1764124"/>
-            <a:ext cx="5814443" cy="990725"/>
-          </a:xfrm>
-          <a:prstGeom prst="rect">
-            <a:avLst/>
-          </a:prstGeom>
-          <a:noFill/>
-          <a:ln>
-            <a:noFill/>
-          </a:ln>
-        </p:spPr>
-        <p:txBody>
-          <a:bodyPr spcFirstLastPara="1" wrap="square" lIns="91425" tIns="91425" rIns="91425" bIns="91425" anchor="t" anchorCtr="0">
-            <a:noAutofit/>
-          </a:bodyPr>
-          <a:lstStyle/>
-          <a:p>
-            <a:pPr marL="0" lvl="0" indent="0" algn="ctr" rtl="0">
-              <a:spcBef>
-                <a:spcPts val="0"/>
-              </a:spcBef>
-              <a:spcAft>
-                <a:spcPts val="0"/>
-              </a:spcAft>
-              <a:buClr>
-                <a:srgbClr val="000000"/>
-              </a:buClr>
-              <a:buSzPts val="1100"/>
-              <a:buFont typeface="Arial"/>
-              <a:buNone/>
-            </a:pPr>
-            <a:r>
-              <a:rPr lang="pt-BR" sz="3600" b="1" dirty="0" smtClean="0">
-                <a:solidFill>
-                  <a:srgbClr val="1D1D1B"/>
-                </a:solidFill>
-                <a:latin typeface="Georgia"/>
-                <a:ea typeface="Georgia"/>
-                <a:cs typeface="Georgia"/>
-                <a:sym typeface="Georgia"/>
-              </a:rPr>
-              <a:t>OBRIGADO!</a:t>
-            </a:r>
-            <a:endParaRPr sz="3600" dirty="0">
-              <a:solidFill>
-                <a:srgbClr val="1D1D1B"/>
-              </a:solidFill>
-              <a:latin typeface="Georgia"/>
-              <a:ea typeface="Georgia"/>
-              <a:cs typeface="Georgia"/>
-              <a:sym typeface="Georgia"/>
-            </a:endParaRPr>
-          </a:p>
-          <a:p>
-            <a:pPr marL="0" lvl="0" indent="0" algn="ctr" rtl="0">
-              <a:spcBef>
-                <a:spcPts val="0"/>
-              </a:spcBef>
-              <a:spcAft>
-                <a:spcPts val="0"/>
-              </a:spcAft>
-              <a:buNone/>
-            </a:pPr>
-            <a:endParaRPr sz="3600" dirty="0">
-              <a:solidFill>
-                <a:srgbClr val="1D1D1B"/>
-              </a:solidFill>
-              <a:latin typeface="Georgia"/>
-              <a:ea typeface="Georgia"/>
-              <a:cs typeface="Georgia"/>
-              <a:sym typeface="Georgia"/>
-            </a:endParaRPr>
-          </a:p>
-          <a:p>
-            <a:pPr marL="0" lvl="0" indent="0" algn="ctr" rtl="0">
-              <a:spcBef>
-                <a:spcPts val="0"/>
-              </a:spcBef>
-              <a:spcAft>
-                <a:spcPts val="0"/>
-              </a:spcAft>
-              <a:buClr>
-                <a:srgbClr val="000000"/>
-              </a:buClr>
-              <a:buSzPts val="1100"/>
-              <a:buFont typeface="Arial"/>
-              <a:buNone/>
-            </a:pPr>
-            <a:endParaRPr sz="3600" dirty="0">
-              <a:solidFill>
-                <a:srgbClr val="1D1D1B"/>
-              </a:solidFill>
-              <a:latin typeface="Georgia"/>
-              <a:ea typeface="Georgia"/>
-              <a:cs typeface="Georgia"/>
-              <a:sym typeface="Georgia"/>
-            </a:endParaRPr>
-          </a:p>
-          <a:p>
-            <a:pPr marL="0" lvl="0" indent="0" algn="ctr" rtl="0">
-              <a:spcBef>
-                <a:spcPts val="0"/>
-              </a:spcBef>
-              <a:spcAft>
-                <a:spcPts val="0"/>
-              </a:spcAft>
-              <a:buNone/>
-            </a:pPr>
-            <a:endParaRPr sz="3600" dirty="0">
-              <a:solidFill>
-                <a:srgbClr val="1D1D1B"/>
-              </a:solidFill>
-              <a:latin typeface="Georgia"/>
-              <a:ea typeface="Georgia"/>
-              <a:cs typeface="Georgia"/>
-              <a:sym typeface="Georgia"/>
-            </a:endParaRPr>
-          </a:p>
-        </p:txBody>
-      </p:sp>
-      <p:sp>
-        <p:nvSpPr>
-          <p:cNvPr id="782" name="Google Shape;782;p38"/>
-          <p:cNvSpPr txBox="1">
-            <a:spLocks noGrp="1"/>
-          </p:cNvSpPr>
-          <p:nvPr>
-            <p:ph type="sldNum" idx="12"/>
-          </p:nvPr>
-        </p:nvSpPr>
-        <p:spPr>
-          <a:xfrm>
-            <a:off x="4297650" y="6290552"/>
-            <a:ext cx="548700" cy="525000"/>
-          </a:xfrm>
-          <a:prstGeom prst="rect">
-            <a:avLst/>
-          </a:prstGeom>
-        </p:spPr>
-        <p:txBody>
-          <a:bodyPr spcFirstLastPara="1" wrap="square" lIns="91425" tIns="91425" rIns="91425" bIns="91425" anchor="t" anchorCtr="0">
-            <a:noAutofit/>
-          </a:bodyPr>
-          <a:lstStyle/>
-          <a:p>
-            <a:pPr marL="0" lvl="0" indent="0" algn="ctr" rtl="0">
-              <a:spcBef>
-                <a:spcPts val="0"/>
-              </a:spcBef>
-              <a:spcAft>
-                <a:spcPts val="0"/>
-              </a:spcAft>
-              <a:buNone/>
-            </a:pPr>
-            <a:fld id="{00000000-1234-1234-1234-123412341234}" type="slidenum">
-              <a:rPr lang="en"/>
-              <a:t>17</a:t>
-            </a:fld>
-            <a:endParaRPr/>
-          </a:p>
-        </p:txBody>
-      </p:sp>
-      <p:sp>
-        <p:nvSpPr>
-          <p:cNvPr id="2" name="CaixaDeTexto 1"/>
-          <p:cNvSpPr txBox="1"/>
-          <p:nvPr/>
-        </p:nvSpPr>
-        <p:spPr>
-          <a:xfrm>
-            <a:off x="3004904" y="4849092"/>
-            <a:ext cx="3562151" cy="954107"/>
-          </a:xfrm>
-          <a:prstGeom prst="rect">
-            <a:avLst/>
-          </a:prstGeom>
-          <a:noFill/>
-        </p:spPr>
-        <p:txBody>
-          <a:bodyPr wrap="square" rtlCol="0">
-            <a:spAutoFit/>
-          </a:bodyPr>
-          <a:lstStyle/>
-          <a:p>
-            <a:pPr algn="ctr"/>
-            <a:r>
-              <a:rPr lang="pt-BR" dirty="0" smtClean="0">
-                <a:latin typeface="Georgia" panose="02040502050405020303" pitchFamily="18" charset="0"/>
-              </a:rPr>
-              <a:t>Edgar Salardani </a:t>
-            </a:r>
-            <a:r>
-              <a:rPr lang="pt-BR" dirty="0" err="1" smtClean="0">
-                <a:latin typeface="Georgia" panose="02040502050405020303" pitchFamily="18" charset="0"/>
-              </a:rPr>
-              <a:t>Senhorello</a:t>
-            </a:r>
-            <a:endParaRPr lang="pt-BR" dirty="0" smtClean="0">
-              <a:latin typeface="Georgia" panose="02040502050405020303" pitchFamily="18" charset="0"/>
-            </a:endParaRPr>
-          </a:p>
-          <a:p>
-            <a:pPr algn="ctr"/>
-            <a:r>
-              <a:rPr lang="pt-BR" dirty="0" smtClean="0">
-                <a:latin typeface="Georgia" panose="02040502050405020303" pitchFamily="18" charset="0"/>
-              </a:rPr>
-              <a:t>Sistemas de Informação – 6º período</a:t>
-            </a:r>
-          </a:p>
-          <a:p>
-            <a:pPr algn="ctr"/>
-            <a:r>
-              <a:rPr lang="pt-BR" dirty="0" err="1" smtClean="0">
-                <a:latin typeface="Georgia" panose="02040502050405020303" pitchFamily="18" charset="0"/>
-              </a:rPr>
-              <a:t>UniRedentor</a:t>
-            </a:r>
-            <a:endParaRPr lang="pt-BR" dirty="0" smtClean="0">
-              <a:latin typeface="Georgia" panose="02040502050405020303" pitchFamily="18" charset="0"/>
-            </a:endParaRPr>
-          </a:p>
-          <a:p>
-            <a:pPr algn="ctr"/>
-            <a:r>
-              <a:rPr lang="pt-BR" dirty="0" smtClean="0">
-                <a:latin typeface="Georgia" panose="02040502050405020303" pitchFamily="18" charset="0"/>
-              </a:rPr>
-              <a:t>Itaperuna - 2018</a:t>
-            </a:r>
-          </a:p>
-        </p:txBody>
-      </p:sp>
-    </p:spTree>
   </p:cSld>
   <p:clrMapOvr>
     <a:masterClrMapping/>
@@ -7812,6 +8427,11 @@
           <a:prstGeom prst="rect">
             <a:avLst/>
           </a:prstGeom>
+          <a:ln>
+            <a:solidFill>
+              <a:schemeClr val="tx1"/>
+            </a:solidFill>
+          </a:ln>
         </p:spPr>
         <p:txBody>
           <a:bodyPr spcFirstLastPara="1" wrap="square" lIns="91425" tIns="91425" rIns="91425" bIns="91425" anchor="t" anchorCtr="0">
@@ -8098,6 +8718,883 @@
               <a:t>2</a:t>
             </a:fld>
             <a:endParaRPr/>
+          </a:p>
+        </p:txBody>
+      </p:sp>
+    </p:spTree>
+  </p:cSld>
+  <p:clrMapOvr>
+    <a:masterClrMapping/>
+  </p:clrMapOvr>
+  <p:timing>
+    <p:tnLst>
+      <p:par>
+        <p:cTn id="1" dur="indefinite" restart="never" nodeType="tmRoot"/>
+      </p:par>
+    </p:tnLst>
+  </p:timing>
+</p:sld>
+</file>
+
+<file path=ppt/slides/slide20.xml><?xml version="1.0" encoding="utf-8"?>
+<p:sld xmlns:a="http://schemas.openxmlformats.org/drawingml/2006/main" xmlns:r="http://schemas.openxmlformats.org/officeDocument/2006/relationships" xmlns:p="http://schemas.openxmlformats.org/presentationml/2006/main">
+  <p:cSld>
+    <p:spTree>
+      <p:nvGrpSpPr>
+        <p:cNvPr id="1" name="Shape 131"/>
+        <p:cNvGrpSpPr/>
+        <p:nvPr/>
+      </p:nvGrpSpPr>
+      <p:grpSpPr>
+        <a:xfrm>
+          <a:off x="0" y="0"/>
+          <a:ext cx="0" cy="0"/>
+          <a:chOff x="0" y="0"/>
+          <a:chExt cx="0" cy="0"/>
+        </a:xfrm>
+      </p:grpSpPr>
+      <p:sp>
+        <p:nvSpPr>
+          <p:cNvPr id="132" name="Google Shape;132;p20"/>
+          <p:cNvSpPr txBox="1">
+            <a:spLocks noGrp="1"/>
+          </p:cNvSpPr>
+          <p:nvPr>
+            <p:ph type="title"/>
+          </p:nvPr>
+        </p:nvSpPr>
+        <p:spPr>
+          <a:xfrm>
+            <a:off x="533409" y="540582"/>
+            <a:ext cx="2077278" cy="678618"/>
+          </a:xfrm>
+          <a:prstGeom prst="rect">
+            <a:avLst/>
+          </a:prstGeom>
+          <a:ln>
+            <a:solidFill>
+              <a:schemeClr val="tx1"/>
+            </a:solidFill>
+          </a:ln>
+        </p:spPr>
+        <p:txBody>
+          <a:bodyPr spcFirstLastPara="1" wrap="square" lIns="91425" tIns="91425" rIns="91425" bIns="91425" anchor="t" anchorCtr="0">
+            <a:noAutofit/>
+          </a:bodyPr>
+          <a:lstStyle/>
+          <a:p>
+            <a:pPr marL="0" lvl="0" indent="0" algn="ctr" rtl="0">
+              <a:spcBef>
+                <a:spcPts val="0"/>
+              </a:spcBef>
+              <a:spcAft>
+                <a:spcPts val="0"/>
+              </a:spcAft>
+              <a:buNone/>
+            </a:pPr>
+            <a:r>
+              <a:rPr lang="en" dirty="0" smtClean="0">
+                <a:solidFill>
+                  <a:schemeClr val="tx1"/>
+                </a:solidFill>
+              </a:rPr>
+              <a:t>Referências</a:t>
+            </a:r>
+            <a:endParaRPr dirty="0">
+              <a:solidFill>
+                <a:schemeClr val="tx1"/>
+              </a:solidFill>
+            </a:endParaRPr>
+          </a:p>
+        </p:txBody>
+      </p:sp>
+      <p:sp>
+        <p:nvSpPr>
+          <p:cNvPr id="133" name="Google Shape;133;p20"/>
+          <p:cNvSpPr txBox="1">
+            <a:spLocks noGrp="1"/>
+          </p:cNvSpPr>
+          <p:nvPr>
+            <p:ph type="body" idx="1"/>
+          </p:nvPr>
+        </p:nvSpPr>
+        <p:spPr>
+          <a:xfrm>
+            <a:off x="1082109" y="1700243"/>
+            <a:ext cx="7368209" cy="4886709"/>
+          </a:xfrm>
+          <a:prstGeom prst="rect">
+            <a:avLst/>
+          </a:prstGeom>
+        </p:spPr>
+        <p:txBody>
+          <a:bodyPr spcFirstLastPara="1" wrap="square" lIns="91425" tIns="91425" rIns="91425" bIns="91425" anchor="t" anchorCtr="0">
+            <a:noAutofit/>
+          </a:bodyPr>
+          <a:lstStyle/>
+          <a:p>
+            <a:pPr algn="just"/>
+            <a:r>
+              <a:rPr lang="pt-BR" sz="1600" dirty="0"/>
+              <a:t>ANDROIDDEVELOPERS, </a:t>
+            </a:r>
+            <a:r>
+              <a:rPr lang="pt-BR" sz="1600" b="1" dirty="0"/>
+              <a:t>Conheça o Android Studio</a:t>
+            </a:r>
+            <a:r>
+              <a:rPr lang="pt-BR" sz="1600" dirty="0"/>
+              <a:t>. Disponível em: &lt;https://developer.android.com/studio/intro/?hl=pt-br&gt;. Acesso em: 20 de novembro de 2018.</a:t>
+            </a:r>
+          </a:p>
+          <a:p>
+            <a:pPr algn="just"/>
+            <a:r>
+              <a:rPr lang="pt-BR" sz="1600" dirty="0" smtClean="0"/>
+              <a:t>FREITAS</a:t>
+            </a:r>
+            <a:r>
+              <a:rPr lang="pt-BR" sz="1600" dirty="0"/>
+              <a:t>, G.L. et al. </a:t>
+            </a:r>
+            <a:r>
+              <a:rPr lang="pt-BR" sz="1600" b="1" dirty="0"/>
+              <a:t>Discutindo a política à saúde da mulher no contexto da promoção da saúde</a:t>
+            </a:r>
+            <a:r>
+              <a:rPr lang="pt-BR" sz="1600" dirty="0"/>
+              <a:t>. </a:t>
+            </a:r>
+            <a:r>
+              <a:rPr lang="pt-BR" sz="1600" dirty="0" err="1"/>
+              <a:t>Tev</a:t>
+            </a:r>
+            <a:r>
+              <a:rPr lang="pt-BR" sz="1600" dirty="0"/>
+              <a:t>. Eletr. </a:t>
+            </a:r>
+            <a:r>
+              <a:rPr lang="pt-BR" sz="1600" dirty="0" err="1"/>
+              <a:t>Enferm</a:t>
+            </a:r>
+            <a:r>
+              <a:rPr lang="pt-BR" sz="1600" dirty="0"/>
+              <a:t>., Goiânia, v.11, n.2, p.424-428, 2009</a:t>
+            </a:r>
+            <a:r>
+              <a:rPr lang="pt-BR" sz="1600" dirty="0" smtClean="0"/>
+              <a:t>).</a:t>
+            </a:r>
+            <a:endParaRPr lang="pt-BR" sz="1600" dirty="0"/>
+          </a:p>
+          <a:p>
+            <a:pPr algn="just"/>
+            <a:r>
+              <a:rPr lang="pt-BR" sz="1600" dirty="0"/>
+              <a:t>GIL, </a:t>
+            </a:r>
+            <a:r>
+              <a:rPr lang="pt-BR" sz="1600" dirty="0" err="1"/>
+              <a:t>Antonio</a:t>
+            </a:r>
+            <a:r>
+              <a:rPr lang="pt-BR" sz="1600" dirty="0"/>
+              <a:t> Carlos. </a:t>
+            </a:r>
+            <a:r>
+              <a:rPr lang="pt-BR" sz="1600" b="1" dirty="0"/>
+              <a:t>Como elaborar projetos de pesquisa</a:t>
+            </a:r>
+            <a:r>
+              <a:rPr lang="pt-BR" sz="1600" dirty="0"/>
+              <a:t>. 4. ed. São Paulo: Atlas, 2007</a:t>
+            </a:r>
+            <a:r>
+              <a:rPr lang="pt-BR" sz="1600" dirty="0" smtClean="0"/>
+              <a:t>.</a:t>
+            </a:r>
+            <a:r>
+              <a:rPr lang="pt-BR" sz="1600" dirty="0"/>
+              <a:t> </a:t>
+            </a:r>
+          </a:p>
+          <a:p>
+            <a:pPr algn="just"/>
+            <a:r>
+              <a:rPr lang="pt-BR" sz="1600" dirty="0"/>
+              <a:t>JEANVARGAS, </a:t>
+            </a:r>
+            <a:r>
+              <a:rPr lang="pt-BR" sz="1600" b="1" dirty="0"/>
+              <a:t>Conheça o Android Studio, a ferramenta oficial de </a:t>
+            </a:r>
+            <a:r>
+              <a:rPr lang="pt-BR" sz="1600" b="1" dirty="0" err="1"/>
+              <a:t>Apps</a:t>
+            </a:r>
+            <a:r>
+              <a:rPr lang="pt-BR" sz="1600" b="1" dirty="0"/>
+              <a:t> para Android. </a:t>
+            </a:r>
+            <a:r>
+              <a:rPr lang="pt-BR" sz="1600" dirty="0"/>
+              <a:t>Disponível em: &lt; https://jeanvargas.com.br/conheca-o-android-studio-ferramenta-oficial-para-o-desenvolvimento-de-apps-para-android/&gt;. Acesso em: 20 de novembro de 2018.  </a:t>
+            </a:r>
+          </a:p>
+          <a:p>
+            <a:pPr algn="just"/>
+            <a:r>
+              <a:rPr lang="pt-BR" sz="1600" dirty="0"/>
+              <a:t>LECHETA, Ricardo R. </a:t>
+            </a:r>
+            <a:r>
+              <a:rPr lang="pt-BR" sz="1600" b="1" dirty="0"/>
+              <a:t>Google Android – Aprenda A Criar Aplicações: Para Dispositivos Móveis Com O Android SDK</a:t>
+            </a:r>
+            <a:r>
+              <a:rPr lang="pt-BR" sz="1600" dirty="0"/>
+              <a:t>. </a:t>
+            </a:r>
+            <a:r>
+              <a:rPr lang="pt-BR" sz="1600" dirty="0" err="1"/>
+              <a:t>Novatec</a:t>
+            </a:r>
+            <a:r>
+              <a:rPr lang="pt-BR" sz="1600" dirty="0"/>
+              <a:t> Editora, 2009</a:t>
+            </a:r>
+            <a:r>
+              <a:rPr lang="pt-BR" sz="1600" dirty="0" smtClean="0"/>
+              <a:t>.</a:t>
+            </a:r>
+            <a:r>
+              <a:rPr lang="pt-BR" sz="1600" dirty="0"/>
+              <a:t> </a:t>
+            </a:r>
+          </a:p>
+          <a:p>
+            <a:pPr algn="just"/>
+            <a:endParaRPr lang="pt-BR" sz="1600" dirty="0" smtClean="0"/>
+          </a:p>
+          <a:p>
+            <a:pPr algn="just"/>
+            <a:endParaRPr lang="pt-BR" sz="1600" dirty="0"/>
+          </a:p>
+        </p:txBody>
+      </p:sp>
+      <p:sp>
+        <p:nvSpPr>
+          <p:cNvPr id="135" name="Google Shape;135;p20"/>
+          <p:cNvSpPr txBox="1">
+            <a:spLocks noGrp="1"/>
+          </p:cNvSpPr>
+          <p:nvPr>
+            <p:ph type="sldNum" idx="12"/>
+          </p:nvPr>
+        </p:nvSpPr>
+        <p:spPr>
+          <a:xfrm>
+            <a:off x="533409" y="6061952"/>
+            <a:ext cx="548700" cy="525000"/>
+          </a:xfrm>
+          <a:prstGeom prst="rect">
+            <a:avLst/>
+          </a:prstGeom>
+        </p:spPr>
+        <p:txBody>
+          <a:bodyPr spcFirstLastPara="1" wrap="square" lIns="91425" tIns="91425" rIns="91425" bIns="91425" anchor="t" anchorCtr="0">
+            <a:noAutofit/>
+          </a:bodyPr>
+          <a:lstStyle/>
+          <a:p>
+            <a:pPr marL="0" lvl="0" indent="0" algn="l" rtl="0">
+              <a:spcBef>
+                <a:spcPts val="0"/>
+              </a:spcBef>
+              <a:spcAft>
+                <a:spcPts val="0"/>
+              </a:spcAft>
+              <a:buNone/>
+            </a:pPr>
+            <a:fld id="{00000000-1234-1234-1234-123412341234}" type="slidenum">
+              <a:rPr lang="en"/>
+              <a:t>20</a:t>
+            </a:fld>
+            <a:endParaRPr/>
+          </a:p>
+        </p:txBody>
+      </p:sp>
+    </p:spTree>
+    <p:extLst>
+      <p:ext uri="{BB962C8B-B14F-4D97-AF65-F5344CB8AC3E}">
+        <p14:creationId xmlns:p14="http://schemas.microsoft.com/office/powerpoint/2010/main" val="1113655687"/>
+      </p:ext>
+    </p:extLst>
+  </p:cSld>
+  <p:clrMapOvr>
+    <a:masterClrMapping/>
+  </p:clrMapOvr>
+  <p:timing>
+    <p:tnLst>
+      <p:par>
+        <p:cTn id="1" dur="indefinite" restart="never" nodeType="tmRoot"/>
+      </p:par>
+    </p:tnLst>
+  </p:timing>
+</p:sld>
+</file>
+
+<file path=ppt/slides/slide21.xml><?xml version="1.0" encoding="utf-8"?>
+<p:sld xmlns:a="http://schemas.openxmlformats.org/drawingml/2006/main" xmlns:r="http://schemas.openxmlformats.org/officeDocument/2006/relationships" xmlns:p="http://schemas.openxmlformats.org/presentationml/2006/main">
+  <p:cSld>
+    <p:spTree>
+      <p:nvGrpSpPr>
+        <p:cNvPr id="1" name="Shape 131"/>
+        <p:cNvGrpSpPr/>
+        <p:nvPr/>
+      </p:nvGrpSpPr>
+      <p:grpSpPr>
+        <a:xfrm>
+          <a:off x="0" y="0"/>
+          <a:ext cx="0" cy="0"/>
+          <a:chOff x="0" y="0"/>
+          <a:chExt cx="0" cy="0"/>
+        </a:xfrm>
+      </p:grpSpPr>
+      <p:sp>
+        <p:nvSpPr>
+          <p:cNvPr id="132" name="Google Shape;132;p20"/>
+          <p:cNvSpPr txBox="1">
+            <a:spLocks noGrp="1"/>
+          </p:cNvSpPr>
+          <p:nvPr>
+            <p:ph type="title"/>
+          </p:nvPr>
+        </p:nvSpPr>
+        <p:spPr>
+          <a:xfrm>
+            <a:off x="533409" y="567086"/>
+            <a:ext cx="2077278" cy="678618"/>
+          </a:xfrm>
+          <a:prstGeom prst="rect">
+            <a:avLst/>
+          </a:prstGeom>
+          <a:ln>
+            <a:solidFill>
+              <a:schemeClr val="tx1"/>
+            </a:solidFill>
+          </a:ln>
+        </p:spPr>
+        <p:txBody>
+          <a:bodyPr spcFirstLastPara="1" wrap="square" lIns="91425" tIns="91425" rIns="91425" bIns="91425" anchor="t" anchorCtr="0">
+            <a:noAutofit/>
+          </a:bodyPr>
+          <a:lstStyle/>
+          <a:p>
+            <a:pPr marL="0" lvl="0" indent="0" algn="ctr" rtl="0">
+              <a:spcBef>
+                <a:spcPts val="0"/>
+              </a:spcBef>
+              <a:spcAft>
+                <a:spcPts val="0"/>
+              </a:spcAft>
+              <a:buNone/>
+            </a:pPr>
+            <a:r>
+              <a:rPr lang="en" dirty="0" smtClean="0">
+                <a:solidFill>
+                  <a:schemeClr val="tx1"/>
+                </a:solidFill>
+              </a:rPr>
+              <a:t>Referências</a:t>
+            </a:r>
+            <a:endParaRPr dirty="0">
+              <a:solidFill>
+                <a:schemeClr val="tx1"/>
+              </a:solidFill>
+            </a:endParaRPr>
+          </a:p>
+        </p:txBody>
+      </p:sp>
+      <p:sp>
+        <p:nvSpPr>
+          <p:cNvPr id="133" name="Google Shape;133;p20"/>
+          <p:cNvSpPr txBox="1">
+            <a:spLocks noGrp="1"/>
+          </p:cNvSpPr>
+          <p:nvPr>
+            <p:ph type="body" idx="1"/>
+          </p:nvPr>
+        </p:nvSpPr>
+        <p:spPr>
+          <a:xfrm>
+            <a:off x="1082109" y="1700243"/>
+            <a:ext cx="7368209" cy="4886709"/>
+          </a:xfrm>
+          <a:prstGeom prst="rect">
+            <a:avLst/>
+          </a:prstGeom>
+        </p:spPr>
+        <p:txBody>
+          <a:bodyPr spcFirstLastPara="1" wrap="square" lIns="91425" tIns="91425" rIns="91425" bIns="91425" anchor="t" anchorCtr="0">
+            <a:noAutofit/>
+          </a:bodyPr>
+          <a:lstStyle/>
+          <a:p>
+            <a:r>
+              <a:rPr lang="pt-BR" sz="1600" dirty="0"/>
+              <a:t>MELO, Luciana de </a:t>
+            </a:r>
+            <a:r>
+              <a:rPr lang="pt-BR" sz="1600" dirty="0" err="1"/>
+              <a:t>Lione</a:t>
+            </a:r>
+            <a:r>
+              <a:rPr lang="pt-BR" sz="1600" dirty="0"/>
+              <a:t>; LIMA, Maria Alice Dias da Silva. </a:t>
+            </a:r>
+            <a:r>
+              <a:rPr lang="pt-BR" sz="1600" b="1" dirty="0"/>
+              <a:t>Mulheres no segundo e terceiro trimestres de gravidez: suas alterações psicológicas</a:t>
+            </a:r>
+            <a:r>
+              <a:rPr lang="pt-BR" sz="1600" dirty="0"/>
+              <a:t>. Rev. bras. </a:t>
+            </a:r>
+            <a:r>
+              <a:rPr lang="pt-BR" sz="1600" dirty="0" err="1"/>
+              <a:t>enferm</a:t>
+            </a:r>
+            <a:r>
+              <a:rPr lang="pt-BR" sz="1600" dirty="0"/>
+              <a:t>.,  Brasília ,  v. 53, n. 1, p. 81-86,  Mar.  2000 .   Disponível em: &lt;http://dx.doi.org/10.1590/S0034-1672000000100010&gt;. Acesso em  26  de setembro  2018</a:t>
+            </a:r>
+            <a:r>
+              <a:rPr lang="pt-BR" sz="1600" dirty="0" smtClean="0"/>
+              <a:t>.</a:t>
+            </a:r>
+            <a:r>
+              <a:rPr lang="pt-BR" sz="1600" dirty="0"/>
+              <a:t> </a:t>
+            </a:r>
+          </a:p>
+          <a:p>
+            <a:r>
+              <a:rPr lang="pt-BR" sz="1600" dirty="0"/>
+              <a:t>NASCIMENTO, Natália Magalhães do et al . </a:t>
+            </a:r>
+            <a:r>
+              <a:rPr lang="pt-BR" sz="1600" b="1" dirty="0"/>
+              <a:t>Tecnologias não invasivas de cuidado no parto realizadas por enfermeiras: a percepção de mulheres</a:t>
+            </a:r>
+            <a:r>
+              <a:rPr lang="pt-BR" sz="1600" dirty="0"/>
+              <a:t>. Esc. Anna Nery,  Rio de Janeiro ,  v. 14, n. 3, p. 456-461,  </a:t>
+            </a:r>
+            <a:r>
+              <a:rPr lang="pt-BR" sz="1600" dirty="0" err="1"/>
+              <a:t>Sept</a:t>
+            </a:r>
+            <a:r>
+              <a:rPr lang="pt-BR" sz="1600" dirty="0"/>
+              <a:t>.  2010. Disponível em: &lt;http://dx.doi.org/10.1590/S1414-81452010000300004&gt;. Acesso em  10 de agosto  2018</a:t>
+            </a:r>
+            <a:r>
+              <a:rPr lang="pt-BR" sz="1600" dirty="0" smtClean="0"/>
+              <a:t>.</a:t>
+            </a:r>
+            <a:r>
+              <a:rPr lang="pt-BR" sz="1600" dirty="0"/>
+              <a:t> </a:t>
+            </a:r>
+          </a:p>
+          <a:p>
+            <a:r>
+              <a:rPr lang="pt-BR" sz="1600" dirty="0"/>
+              <a:t>PEREIRA, Lucio Camilo Oliva; DA SILVA, Michel Lourenço. </a:t>
+            </a:r>
+            <a:r>
+              <a:rPr lang="pt-BR" sz="1600" b="1" dirty="0"/>
+              <a:t>Android para desenvolvedores</a:t>
+            </a:r>
+            <a:r>
+              <a:rPr lang="pt-BR" sz="1600" dirty="0"/>
+              <a:t>. </a:t>
+            </a:r>
+            <a:r>
+              <a:rPr lang="pt-BR" sz="1600" dirty="0" err="1"/>
+              <a:t>Brasport</a:t>
+            </a:r>
+            <a:r>
+              <a:rPr lang="pt-BR" sz="1600" dirty="0"/>
+              <a:t>, 2009</a:t>
+            </a:r>
+            <a:r>
+              <a:rPr lang="pt-BR" sz="1600" dirty="0" smtClean="0"/>
+              <a:t>.</a:t>
+            </a:r>
+            <a:r>
+              <a:rPr lang="pt-BR" sz="1600" dirty="0"/>
+              <a:t> </a:t>
+            </a:r>
+          </a:p>
+          <a:p>
+            <a:r>
+              <a:rPr lang="pt-BR" sz="1600" dirty="0"/>
+              <a:t>SILVA, Laura </a:t>
+            </a:r>
+            <a:r>
+              <a:rPr lang="pt-BR" sz="1600" dirty="0" err="1"/>
+              <a:t>Johanson</a:t>
+            </a:r>
+            <a:r>
+              <a:rPr lang="pt-BR" sz="1600" dirty="0"/>
+              <a:t> da; SILVA, Leila Rangel da. </a:t>
+            </a:r>
+            <a:r>
+              <a:rPr lang="pt-BR" sz="1600" b="1" dirty="0"/>
+              <a:t>Mudanças na vida e no corpo: vivências diante da gravidez na perspectiva afetiva dos pais</a:t>
+            </a:r>
+            <a:r>
+              <a:rPr lang="pt-BR" sz="1600" dirty="0"/>
+              <a:t>. Esc. Anna Nery,  Rio de Janeiro ,  v. 13, n. 2, p. 393-401,  Junho  2009.  Disponível em: &lt;http://dx.doi.org/10.1590/S1414-81452009000200022&gt;. Acesso em  26  de setembro  2018.</a:t>
+            </a:r>
+          </a:p>
+          <a:p>
+            <a:pPr algn="just"/>
+            <a:endParaRPr lang="pt-BR" sz="1600" dirty="0" smtClean="0"/>
+          </a:p>
+          <a:p>
+            <a:pPr algn="just"/>
+            <a:endParaRPr lang="pt-BR" sz="1600" dirty="0"/>
+          </a:p>
+        </p:txBody>
+      </p:sp>
+      <p:sp>
+        <p:nvSpPr>
+          <p:cNvPr id="135" name="Google Shape;135;p20"/>
+          <p:cNvSpPr txBox="1">
+            <a:spLocks noGrp="1"/>
+          </p:cNvSpPr>
+          <p:nvPr>
+            <p:ph type="sldNum" idx="12"/>
+          </p:nvPr>
+        </p:nvSpPr>
+        <p:spPr>
+          <a:xfrm>
+            <a:off x="533409" y="6061952"/>
+            <a:ext cx="548700" cy="525000"/>
+          </a:xfrm>
+          <a:prstGeom prst="rect">
+            <a:avLst/>
+          </a:prstGeom>
+        </p:spPr>
+        <p:txBody>
+          <a:bodyPr spcFirstLastPara="1" wrap="square" lIns="91425" tIns="91425" rIns="91425" bIns="91425" anchor="t" anchorCtr="0">
+            <a:noAutofit/>
+          </a:bodyPr>
+          <a:lstStyle/>
+          <a:p>
+            <a:pPr marL="0" lvl="0" indent="0" algn="l" rtl="0">
+              <a:spcBef>
+                <a:spcPts val="0"/>
+              </a:spcBef>
+              <a:spcAft>
+                <a:spcPts val="0"/>
+              </a:spcAft>
+              <a:buNone/>
+            </a:pPr>
+            <a:fld id="{00000000-1234-1234-1234-123412341234}" type="slidenum">
+              <a:rPr lang="en"/>
+              <a:t>21</a:t>
+            </a:fld>
+            <a:endParaRPr/>
+          </a:p>
+        </p:txBody>
+      </p:sp>
+    </p:spTree>
+    <p:extLst>
+      <p:ext uri="{BB962C8B-B14F-4D97-AF65-F5344CB8AC3E}">
+        <p14:creationId xmlns:p14="http://schemas.microsoft.com/office/powerpoint/2010/main" val="2554634135"/>
+      </p:ext>
+    </p:extLst>
+  </p:cSld>
+  <p:clrMapOvr>
+    <a:masterClrMapping/>
+  </p:clrMapOvr>
+  <p:timing>
+    <p:tnLst>
+      <p:par>
+        <p:cTn id="1" dur="indefinite" restart="never" nodeType="tmRoot"/>
+      </p:par>
+    </p:tnLst>
+  </p:timing>
+</p:sld>
+</file>
+
+<file path=ppt/slides/slide22.xml><?xml version="1.0" encoding="utf-8"?>
+<p:sld xmlns:a="http://schemas.openxmlformats.org/drawingml/2006/main" xmlns:r="http://schemas.openxmlformats.org/officeDocument/2006/relationships" xmlns:p="http://schemas.openxmlformats.org/presentationml/2006/main">
+  <p:cSld>
+    <p:bg>
+      <p:bgPr>
+        <a:solidFill>
+          <a:srgbClr val="EFEFEF"/>
+        </a:solidFill>
+        <a:effectLst/>
+      </p:bgPr>
+    </p:bg>
+    <p:spTree>
+      <p:nvGrpSpPr>
+        <p:cNvPr id="1" name="Shape 778"/>
+        <p:cNvGrpSpPr/>
+        <p:nvPr/>
+      </p:nvGrpSpPr>
+      <p:grpSpPr>
+        <a:xfrm>
+          <a:off x="0" y="0"/>
+          <a:ext cx="0" cy="0"/>
+          <a:chOff x="0" y="0"/>
+          <a:chExt cx="0" cy="0"/>
+        </a:xfrm>
+      </p:grpSpPr>
+      <p:sp>
+        <p:nvSpPr>
+          <p:cNvPr id="779" name="Google Shape;779;p38"/>
+          <p:cNvSpPr txBox="1"/>
+          <p:nvPr/>
+        </p:nvSpPr>
+        <p:spPr>
+          <a:xfrm>
+            <a:off x="1939128" y="1764124"/>
+            <a:ext cx="5814443" cy="990725"/>
+          </a:xfrm>
+          <a:prstGeom prst="rect">
+            <a:avLst/>
+          </a:prstGeom>
+          <a:noFill/>
+          <a:ln>
+            <a:noFill/>
+          </a:ln>
+        </p:spPr>
+        <p:txBody>
+          <a:bodyPr spcFirstLastPara="1" wrap="square" lIns="91425" tIns="91425" rIns="91425" bIns="91425" anchor="t" anchorCtr="0">
+            <a:noAutofit/>
+          </a:bodyPr>
+          <a:lstStyle/>
+          <a:p>
+            <a:pPr marL="0" lvl="0" indent="0" algn="ctr" rtl="0">
+              <a:spcBef>
+                <a:spcPts val="0"/>
+              </a:spcBef>
+              <a:spcAft>
+                <a:spcPts val="0"/>
+              </a:spcAft>
+              <a:buClr>
+                <a:srgbClr val="000000"/>
+              </a:buClr>
+              <a:buSzPts val="1100"/>
+              <a:buFont typeface="Arial"/>
+              <a:buNone/>
+            </a:pPr>
+            <a:r>
+              <a:rPr lang="pt-BR" sz="3600" b="1" dirty="0" smtClean="0">
+                <a:solidFill>
+                  <a:srgbClr val="1D1D1B"/>
+                </a:solidFill>
+                <a:latin typeface="Georgia"/>
+                <a:ea typeface="Georgia"/>
+                <a:cs typeface="Georgia"/>
+                <a:sym typeface="Georgia"/>
+              </a:rPr>
+              <a:t>OBRIGADO!</a:t>
+            </a:r>
+            <a:endParaRPr sz="3600" dirty="0">
+              <a:solidFill>
+                <a:srgbClr val="1D1D1B"/>
+              </a:solidFill>
+              <a:latin typeface="Georgia"/>
+              <a:ea typeface="Georgia"/>
+              <a:cs typeface="Georgia"/>
+              <a:sym typeface="Georgia"/>
+            </a:endParaRPr>
+          </a:p>
+          <a:p>
+            <a:pPr marL="0" lvl="0" indent="0" algn="ctr" rtl="0">
+              <a:spcBef>
+                <a:spcPts val="0"/>
+              </a:spcBef>
+              <a:spcAft>
+                <a:spcPts val="0"/>
+              </a:spcAft>
+              <a:buNone/>
+            </a:pPr>
+            <a:endParaRPr sz="3600" dirty="0">
+              <a:solidFill>
+                <a:srgbClr val="1D1D1B"/>
+              </a:solidFill>
+              <a:latin typeface="Georgia"/>
+              <a:ea typeface="Georgia"/>
+              <a:cs typeface="Georgia"/>
+              <a:sym typeface="Georgia"/>
+            </a:endParaRPr>
+          </a:p>
+          <a:p>
+            <a:pPr marL="0" lvl="0" indent="0" algn="ctr" rtl="0">
+              <a:spcBef>
+                <a:spcPts val="0"/>
+              </a:spcBef>
+              <a:spcAft>
+                <a:spcPts val="0"/>
+              </a:spcAft>
+              <a:buClr>
+                <a:srgbClr val="000000"/>
+              </a:buClr>
+              <a:buSzPts val="1100"/>
+              <a:buFont typeface="Arial"/>
+              <a:buNone/>
+            </a:pPr>
+            <a:endParaRPr sz="3600" dirty="0">
+              <a:solidFill>
+                <a:srgbClr val="1D1D1B"/>
+              </a:solidFill>
+              <a:latin typeface="Georgia"/>
+              <a:ea typeface="Georgia"/>
+              <a:cs typeface="Georgia"/>
+              <a:sym typeface="Georgia"/>
+            </a:endParaRPr>
+          </a:p>
+          <a:p>
+            <a:pPr marL="0" lvl="0" indent="0" algn="ctr" rtl="0">
+              <a:spcBef>
+                <a:spcPts val="0"/>
+              </a:spcBef>
+              <a:spcAft>
+                <a:spcPts val="0"/>
+              </a:spcAft>
+              <a:buNone/>
+            </a:pPr>
+            <a:endParaRPr sz="3600" dirty="0">
+              <a:solidFill>
+                <a:srgbClr val="1D1D1B"/>
+              </a:solidFill>
+              <a:latin typeface="Georgia"/>
+              <a:ea typeface="Georgia"/>
+              <a:cs typeface="Georgia"/>
+              <a:sym typeface="Georgia"/>
+            </a:endParaRPr>
+          </a:p>
+        </p:txBody>
+      </p:sp>
+      <p:sp>
+        <p:nvSpPr>
+          <p:cNvPr id="782" name="Google Shape;782;p38"/>
+          <p:cNvSpPr txBox="1">
+            <a:spLocks noGrp="1"/>
+          </p:cNvSpPr>
+          <p:nvPr>
+            <p:ph type="sldNum" idx="12"/>
+          </p:nvPr>
+        </p:nvSpPr>
+        <p:spPr>
+          <a:xfrm>
+            <a:off x="4297650" y="6290552"/>
+            <a:ext cx="548700" cy="525000"/>
+          </a:xfrm>
+          <a:prstGeom prst="rect">
+            <a:avLst/>
+          </a:prstGeom>
+        </p:spPr>
+        <p:txBody>
+          <a:bodyPr spcFirstLastPara="1" wrap="square" lIns="91425" tIns="91425" rIns="91425" bIns="91425" anchor="t" anchorCtr="0">
+            <a:noAutofit/>
+          </a:bodyPr>
+          <a:lstStyle/>
+          <a:p>
+            <a:pPr marL="0" lvl="0" indent="0" algn="ctr" rtl="0">
+              <a:spcBef>
+                <a:spcPts val="0"/>
+              </a:spcBef>
+              <a:spcAft>
+                <a:spcPts val="0"/>
+              </a:spcAft>
+              <a:buNone/>
+            </a:pPr>
+            <a:fld id="{00000000-1234-1234-1234-123412341234}" type="slidenum">
+              <a:rPr lang="en"/>
+              <a:t>22</a:t>
+            </a:fld>
+            <a:endParaRPr/>
+          </a:p>
+        </p:txBody>
+      </p:sp>
+      <p:sp>
+        <p:nvSpPr>
+          <p:cNvPr id="2" name="CaixaDeTexto 1"/>
+          <p:cNvSpPr txBox="1"/>
+          <p:nvPr/>
+        </p:nvSpPr>
+        <p:spPr>
+          <a:xfrm>
+            <a:off x="3004904" y="4849092"/>
+            <a:ext cx="3562151" cy="954107"/>
+          </a:xfrm>
+          <a:prstGeom prst="rect">
+            <a:avLst/>
+          </a:prstGeom>
+          <a:noFill/>
+        </p:spPr>
+        <p:txBody>
+          <a:bodyPr wrap="square" rtlCol="0">
+            <a:spAutoFit/>
+          </a:bodyPr>
+          <a:lstStyle/>
+          <a:p>
+            <a:pPr algn="ctr"/>
+            <a:r>
+              <a:rPr lang="pt-BR" dirty="0" smtClean="0">
+                <a:latin typeface="Georgia" panose="02040502050405020303" pitchFamily="18" charset="0"/>
+              </a:rPr>
+              <a:t>Edgar Salardani </a:t>
+            </a:r>
+            <a:r>
+              <a:rPr lang="pt-BR" dirty="0" err="1" smtClean="0">
+                <a:latin typeface="Georgia" panose="02040502050405020303" pitchFamily="18" charset="0"/>
+              </a:rPr>
+              <a:t>Senhorello</a:t>
+            </a:r>
+            <a:endParaRPr lang="pt-BR" dirty="0" smtClean="0">
+              <a:latin typeface="Georgia" panose="02040502050405020303" pitchFamily="18" charset="0"/>
+            </a:endParaRPr>
+          </a:p>
+          <a:p>
+            <a:pPr algn="ctr"/>
+            <a:r>
+              <a:rPr lang="pt-BR" dirty="0" smtClean="0">
+                <a:latin typeface="Georgia" panose="02040502050405020303" pitchFamily="18" charset="0"/>
+              </a:rPr>
+              <a:t>Sistemas de Informação – 6º período</a:t>
+            </a:r>
+          </a:p>
+          <a:p>
+            <a:pPr algn="ctr"/>
+            <a:r>
+              <a:rPr lang="pt-BR" dirty="0" err="1" smtClean="0">
+                <a:latin typeface="Georgia" panose="02040502050405020303" pitchFamily="18" charset="0"/>
+              </a:rPr>
+              <a:t>UniRedentor</a:t>
+            </a:r>
+            <a:endParaRPr lang="pt-BR" dirty="0" smtClean="0">
+              <a:latin typeface="Georgia" panose="02040502050405020303" pitchFamily="18" charset="0"/>
+            </a:endParaRPr>
+          </a:p>
+          <a:p>
+            <a:pPr algn="ctr"/>
+            <a:r>
+              <a:rPr lang="pt-BR" dirty="0" smtClean="0">
+                <a:latin typeface="Georgia" panose="02040502050405020303" pitchFamily="18" charset="0"/>
+              </a:rPr>
+              <a:t>Itaperuna - 2018</a:t>
+            </a:r>
           </a:p>
         </p:txBody>
       </p:sp>
@@ -8151,6 +9648,11 @@
           <a:prstGeom prst="rect">
             <a:avLst/>
           </a:prstGeom>
+          <a:ln>
+            <a:solidFill>
+              <a:schemeClr val="tx1"/>
+            </a:solidFill>
+          </a:ln>
         </p:spPr>
         <p:txBody>
           <a:bodyPr spcFirstLastPara="1" wrap="square" lIns="91425" tIns="91425" rIns="91425" bIns="91425" anchor="t" anchorCtr="0">
@@ -8191,7 +9693,7 @@
         </p:nvSpPr>
         <p:spPr>
           <a:xfrm>
-            <a:off x="1432891" y="2322405"/>
+            <a:off x="1591917" y="1474265"/>
             <a:ext cx="6598200" cy="1278414"/>
           </a:xfrm>
           <a:prstGeom prst="rect">
@@ -8226,12 +9728,16 @@
               <a:t> pelas mulheres gestantes gera acolhimento, segurança e preparação, além da contribuição do </a:t>
             </a:r>
             <a:r>
-              <a:rPr lang="pt-BR" sz="2000" b="1" dirty="0" err="1"/>
-              <a:t>emponderamento</a:t>
+              <a:rPr lang="pt-BR" sz="2000" b="1" dirty="0" smtClean="0"/>
+              <a:t>empoderamento</a:t>
+            </a:r>
+            <a:r>
+              <a:rPr lang="pt-BR" sz="2000" dirty="0" smtClean="0"/>
+              <a:t> </a:t>
             </a:r>
             <a:r>
               <a:rPr lang="pt-BR" sz="2000" dirty="0"/>
-              <a:t> durante a gravidez. </a:t>
+              <a:t>durante a gravidez. </a:t>
             </a:r>
             <a:endParaRPr lang="pt-BR" sz="2000" dirty="0" smtClean="0"/>
           </a:p>
@@ -8312,6 +9818,254 @@
               <a:t>3</a:t>
             </a:fld>
             <a:endParaRPr/>
+          </a:p>
+        </p:txBody>
+      </p:sp>
+      <p:sp>
+        <p:nvSpPr>
+          <p:cNvPr id="6" name="Elipse 5"/>
+          <p:cNvSpPr/>
+          <p:nvPr/>
+        </p:nvSpPr>
+        <p:spPr>
+          <a:xfrm>
+            <a:off x="5775891" y="3509593"/>
+            <a:ext cx="1895060" cy="1834509"/>
+          </a:xfrm>
+          <a:prstGeom prst="ellipse">
+            <a:avLst/>
+          </a:prstGeom>
+          <a:noFill/>
+          <a:ln>
+            <a:solidFill>
+              <a:srgbClr val="FF0000"/>
+            </a:solidFill>
+          </a:ln>
+        </p:spPr>
+        <p:style>
+          <a:lnRef idx="2">
+            <a:schemeClr val="accent6"/>
+          </a:lnRef>
+          <a:fillRef idx="1">
+            <a:schemeClr val="lt1"/>
+          </a:fillRef>
+          <a:effectRef idx="0">
+            <a:schemeClr val="accent6"/>
+          </a:effectRef>
+          <a:fontRef idx="minor">
+            <a:schemeClr val="dk1"/>
+          </a:fontRef>
+        </p:style>
+        <p:txBody>
+          <a:bodyPr rtlCol="0" anchor="ctr"/>
+          <a:lstStyle/>
+          <a:p>
+            <a:pPr algn="ctr"/>
+            <a:endParaRPr lang="pt-BR"/>
+          </a:p>
+        </p:txBody>
+      </p:sp>
+      <p:sp>
+        <p:nvSpPr>
+          <p:cNvPr id="2" name="Elipse 1"/>
+          <p:cNvSpPr/>
+          <p:nvPr/>
+        </p:nvSpPr>
+        <p:spPr>
+          <a:xfrm>
+            <a:off x="4519957" y="4211959"/>
+            <a:ext cx="1895060" cy="1834509"/>
+          </a:xfrm>
+          <a:prstGeom prst="ellipse">
+            <a:avLst/>
+          </a:prstGeom>
+          <a:noFill/>
+          <a:ln>
+            <a:solidFill>
+              <a:schemeClr val="accent5">
+                <a:lumMod val="75000"/>
+              </a:schemeClr>
+            </a:solidFill>
+          </a:ln>
+        </p:spPr>
+        <p:style>
+          <a:lnRef idx="2">
+            <a:schemeClr val="accent6"/>
+          </a:lnRef>
+          <a:fillRef idx="1">
+            <a:schemeClr val="lt1"/>
+          </a:fillRef>
+          <a:effectRef idx="0">
+            <a:schemeClr val="accent6"/>
+          </a:effectRef>
+          <a:fontRef idx="minor">
+            <a:schemeClr val="dk1"/>
+          </a:fontRef>
+        </p:style>
+        <p:txBody>
+          <a:bodyPr rtlCol="0" anchor="ctr"/>
+          <a:lstStyle/>
+          <a:p>
+            <a:pPr algn="ctr"/>
+            <a:endParaRPr lang="pt-BR" dirty="0"/>
+          </a:p>
+        </p:txBody>
+      </p:sp>
+      <p:sp>
+        <p:nvSpPr>
+          <p:cNvPr id="7" name="Elipse 6"/>
+          <p:cNvSpPr/>
+          <p:nvPr/>
+        </p:nvSpPr>
+        <p:spPr>
+          <a:xfrm>
+            <a:off x="5928291" y="4426847"/>
+            <a:ext cx="1895060" cy="1834509"/>
+          </a:xfrm>
+          <a:prstGeom prst="ellipse">
+            <a:avLst/>
+          </a:prstGeom>
+          <a:noFill/>
+          <a:ln>
+            <a:solidFill>
+              <a:srgbClr val="00B050"/>
+            </a:solidFill>
+          </a:ln>
+        </p:spPr>
+        <p:style>
+          <a:lnRef idx="2">
+            <a:schemeClr val="accent6"/>
+          </a:lnRef>
+          <a:fillRef idx="1">
+            <a:schemeClr val="lt1"/>
+          </a:fillRef>
+          <a:effectRef idx="0">
+            <a:schemeClr val="accent6"/>
+          </a:effectRef>
+          <a:fontRef idx="minor">
+            <a:schemeClr val="dk1"/>
+          </a:fontRef>
+        </p:style>
+        <p:txBody>
+          <a:bodyPr rtlCol="0" anchor="ctr"/>
+          <a:lstStyle/>
+          <a:p>
+            <a:pPr algn="ctr"/>
+            <a:endParaRPr lang="pt-BR"/>
+          </a:p>
+        </p:txBody>
+      </p:sp>
+      <p:sp>
+        <p:nvSpPr>
+          <p:cNvPr id="3" name="CaixaDeTexto 2"/>
+          <p:cNvSpPr txBox="1"/>
+          <p:nvPr/>
+        </p:nvSpPr>
+        <p:spPr>
+          <a:xfrm>
+            <a:off x="3117706" y="4990713"/>
+            <a:ext cx="1408333" cy="276999"/>
+          </a:xfrm>
+          <a:prstGeom prst="rect">
+            <a:avLst/>
+          </a:prstGeom>
+          <a:noFill/>
+        </p:spPr>
+        <p:txBody>
+          <a:bodyPr wrap="square" rtlCol="0">
+            <a:spAutoFit/>
+          </a:bodyPr>
+          <a:lstStyle/>
+          <a:p>
+            <a:r>
+              <a:rPr lang="pt-BR" sz="1200" b="1" dirty="0" smtClean="0">
+                <a:solidFill>
+                  <a:srgbClr val="C00000"/>
+                </a:solidFill>
+              </a:rPr>
+              <a:t>ACOLHIMENTO</a:t>
+            </a:r>
+            <a:endParaRPr lang="pt-BR" sz="1200" b="1" dirty="0">
+              <a:solidFill>
+                <a:srgbClr val="C00000"/>
+              </a:solidFill>
+            </a:endParaRPr>
+          </a:p>
+        </p:txBody>
+      </p:sp>
+      <p:sp>
+        <p:nvSpPr>
+          <p:cNvPr id="9" name="CaixaDeTexto 8"/>
+          <p:cNvSpPr txBox="1"/>
+          <p:nvPr/>
+        </p:nvSpPr>
+        <p:spPr>
+          <a:xfrm>
+            <a:off x="7336624" y="6072053"/>
+            <a:ext cx="1173719" cy="276999"/>
+          </a:xfrm>
+          <a:prstGeom prst="rect">
+            <a:avLst/>
+          </a:prstGeom>
+          <a:noFill/>
+        </p:spPr>
+        <p:txBody>
+          <a:bodyPr wrap="none" rtlCol="0">
+            <a:spAutoFit/>
+          </a:bodyPr>
+          <a:lstStyle/>
+          <a:p>
+            <a:r>
+              <a:rPr lang="pt-BR" sz="1200" b="1" dirty="0" smtClean="0">
+                <a:solidFill>
+                  <a:srgbClr val="C00000"/>
+                </a:solidFill>
+              </a:rPr>
+              <a:t>SEGURANÇA</a:t>
+            </a:r>
+            <a:endParaRPr lang="pt-BR" sz="1200" b="1" dirty="0">
+              <a:solidFill>
+                <a:srgbClr val="C00000"/>
+              </a:solidFill>
+            </a:endParaRPr>
+          </a:p>
+        </p:txBody>
+      </p:sp>
+      <p:sp>
+        <p:nvSpPr>
+          <p:cNvPr id="10" name="CaixaDeTexto 9"/>
+          <p:cNvSpPr txBox="1"/>
+          <p:nvPr/>
+        </p:nvSpPr>
+        <p:spPr>
+          <a:xfrm>
+            <a:off x="4763320" y="3632892"/>
+            <a:ext cx="1408333" cy="276999"/>
+          </a:xfrm>
+          <a:prstGeom prst="rect">
+            <a:avLst/>
+          </a:prstGeom>
+          <a:noFill/>
+        </p:spPr>
+        <p:txBody>
+          <a:bodyPr wrap="square" rtlCol="0">
+            <a:spAutoFit/>
+          </a:bodyPr>
+          <a:lstStyle/>
+          <a:p>
+            <a:r>
+              <a:rPr lang="pt-BR" sz="1200" b="1" dirty="0" smtClean="0">
+                <a:solidFill>
+                  <a:srgbClr val="C00000"/>
+                </a:solidFill>
+              </a:rPr>
+              <a:t>PREPARAÇÃO</a:t>
+            </a:r>
+            <a:endParaRPr lang="pt-BR" sz="1200" b="1" dirty="0">
+              <a:solidFill>
+                <a:srgbClr val="C00000"/>
+              </a:solidFill>
+            </a:endParaRPr>
           </a:p>
         </p:txBody>
       </p:sp>
@@ -8369,7 +10123,10 @@
           <a:noFill/>
           <a:ln w="76200" cap="flat" cmpd="sng">
             <a:solidFill>
-              <a:srgbClr val="FF0000"/>
+              <a:schemeClr val="tx1">
+                <a:lumMod val="65000"/>
+                <a:lumOff val="35000"/>
+              </a:schemeClr>
             </a:solidFill>
             <a:prstDash val="solid"/>
             <a:miter lim="8000"/>
@@ -8588,6 +10345,14 @@
           <a:solidFill>
             <a:srgbClr val="F496C5"/>
           </a:solidFill>
+          <a:ln>
+            <a:solidFill>
+              <a:schemeClr val="tx1">
+                <a:lumMod val="65000"/>
+                <a:lumOff val="35000"/>
+              </a:schemeClr>
+            </a:solidFill>
+          </a:ln>
         </p:spPr>
         <p:style>
           <a:lnRef idx="2">
@@ -8673,6 +10438,11 @@
           <a:solidFill>
             <a:srgbClr val="F496C5"/>
           </a:solidFill>
+          <a:ln>
+            <a:solidFill>
+              <a:schemeClr val="tx1"/>
+            </a:solidFill>
+          </a:ln>
         </p:spPr>
         <p:style>
           <a:lnRef idx="2">
@@ -8765,7 +10535,7 @@
           <a:noFill/>
           <a:ln w="76200" cap="flat" cmpd="sng">
             <a:solidFill>
-              <a:srgbClr val="FF0000"/>
+              <a:schemeClr val="tx1"/>
             </a:solidFill>
             <a:prstDash val="solid"/>
             <a:miter lim="8000"/>
@@ -8871,8 +10641,8 @@
         </p:nvSpPr>
         <p:spPr>
           <a:xfrm>
-            <a:off x="947530" y="3552649"/>
-            <a:ext cx="7248939" cy="1046400"/>
+            <a:off x="3289851" y="5503569"/>
+            <a:ext cx="2564295" cy="431501"/>
           </a:xfrm>
           <a:prstGeom prst="rect">
             <a:avLst/>
@@ -8888,18 +10658,10 @@
               <a:buNone/>
             </a:pPr>
             <a:r>
-              <a:rPr lang="pt-BR" i="1" dirty="0" smtClean="0"/>
-              <a:t>“</a:t>
-            </a:r>
-            <a:r>
-              <a:rPr lang="pt-BR" i="1" dirty="0"/>
-              <a:t>Elevar a autoestima das mulheres, em especial das gestantes, com peças íntimas modernas que apresentam conforto, praticidade e elegância</a:t>
-            </a:r>
-            <a:r>
-              <a:rPr lang="pt-BR" i="1" dirty="0" smtClean="0"/>
-              <a:t>.”</a:t>
-            </a:r>
-            <a:endParaRPr lang="pt-BR" i="1" dirty="0"/>
+              <a:rPr lang="pt-BR" sz="1800" i="1" dirty="0" smtClean="0"/>
+              <a:t>Blog Dica de Lingerie</a:t>
+            </a:r>
+            <a:endParaRPr sz="1800" i="1" dirty="0"/>
           </a:p>
         </p:txBody>
       </p:sp>
@@ -8975,295 +10737,33 @@
           </a:prstGeom>
         </p:spPr>
       </p:pic>
-      <p:sp>
-        <p:nvSpPr>
-          <p:cNvPr id="7" name="Google Shape;101;p17"/>
-          <p:cNvSpPr txBox="1">
-            <a:spLocks/>
-          </p:cNvSpPr>
+      <p:pic>
+        <p:nvPicPr>
+          <p:cNvPr id="5" name="Imagem 4"/>
+          <p:cNvPicPr>
+            <a:picLocks noChangeAspect="1"/>
+          </p:cNvPicPr>
           <p:nvPr/>
-        </p:nvSpPr>
-        <p:spPr>
-          <a:xfrm>
-            <a:off x="947530" y="2885212"/>
-            <a:ext cx="7248939" cy="1046400"/>
-          </a:xfrm>
-          <a:prstGeom prst="rect">
-            <a:avLst/>
-          </a:prstGeom>
-          <a:noFill/>
-          <a:ln>
-            <a:noFill/>
-          </a:ln>
-        </p:spPr>
-        <p:txBody>
-          <a:bodyPr spcFirstLastPara="1" wrap="square" lIns="91425" tIns="91425" rIns="91425" bIns="91425" anchor="t" anchorCtr="0">
-            <a:noAutofit/>
-          </a:bodyPr>
-          <a:lstStyle>
-            <a:defPPr marR="0" lvl="0" algn="l" rtl="0">
-              <a:lnSpc>
-                <a:spcPct val="100000"/>
-              </a:lnSpc>
-              <a:spcBef>
-                <a:spcPts val="0"/>
-              </a:spcBef>
-              <a:spcAft>
-                <a:spcPts val="0"/>
-              </a:spcAft>
-            </a:defPPr>
-            <a:lvl1pPr marL="457200" marR="0" lvl="0" indent="-419100" algn="l" rtl="0">
-              <a:lnSpc>
-                <a:spcPct val="100000"/>
-              </a:lnSpc>
-              <a:spcBef>
-                <a:spcPts val="600"/>
-              </a:spcBef>
-              <a:spcAft>
-                <a:spcPts val="0"/>
-              </a:spcAft>
-              <a:buClr>
-                <a:srgbClr val="999999"/>
-              </a:buClr>
-              <a:buSzPts val="3000"/>
-              <a:buFont typeface="Georgia"/>
-              <a:buChar char="□"/>
-              <a:defRPr sz="3000" b="0" i="0" u="none" strike="noStrike" cap="none">
-                <a:solidFill>
-                  <a:srgbClr val="111111"/>
-                </a:solidFill>
-                <a:latin typeface="Georgia"/>
-                <a:ea typeface="Georgia"/>
-                <a:cs typeface="Georgia"/>
-                <a:sym typeface="Georgia"/>
-              </a:defRPr>
-            </a:lvl1pPr>
-            <a:lvl2pPr marL="914400" marR="0" lvl="1" indent="-381000" algn="l" rtl="0">
-              <a:lnSpc>
-                <a:spcPct val="100000"/>
-              </a:lnSpc>
-              <a:spcBef>
-                <a:spcPts val="0"/>
-              </a:spcBef>
-              <a:spcAft>
-                <a:spcPts val="0"/>
-              </a:spcAft>
-              <a:buClr>
-                <a:srgbClr val="999999"/>
-              </a:buClr>
-              <a:buSzPts val="2400"/>
-              <a:buFont typeface="Georgia"/>
-              <a:buChar char="■"/>
-              <a:defRPr sz="2400" b="0" i="0" u="none" strike="noStrike" cap="none">
-                <a:solidFill>
-                  <a:srgbClr val="111111"/>
-                </a:solidFill>
-                <a:latin typeface="Georgia"/>
-                <a:ea typeface="Georgia"/>
-                <a:cs typeface="Georgia"/>
-                <a:sym typeface="Georgia"/>
-              </a:defRPr>
-            </a:lvl2pPr>
-            <a:lvl3pPr marL="1371600" marR="0" lvl="2" indent="-381000" algn="l" rtl="0">
-              <a:lnSpc>
-                <a:spcPct val="100000"/>
-              </a:lnSpc>
-              <a:spcBef>
-                <a:spcPts val="0"/>
-              </a:spcBef>
-              <a:spcAft>
-                <a:spcPts val="0"/>
-              </a:spcAft>
-              <a:buClr>
-                <a:srgbClr val="999999"/>
-              </a:buClr>
-              <a:buSzPts val="2400"/>
-              <a:buFont typeface="Georgia"/>
-              <a:buChar char="▣"/>
-              <a:defRPr sz="2400" b="0" i="0" u="none" strike="noStrike" cap="none">
-                <a:solidFill>
-                  <a:srgbClr val="111111"/>
-                </a:solidFill>
-                <a:latin typeface="Georgia"/>
-                <a:ea typeface="Georgia"/>
-                <a:cs typeface="Georgia"/>
-                <a:sym typeface="Georgia"/>
-              </a:defRPr>
-            </a:lvl3pPr>
-            <a:lvl4pPr marL="1828800" marR="0" lvl="3" indent="-342900" algn="l" rtl="0">
-              <a:lnSpc>
-                <a:spcPct val="100000"/>
-              </a:lnSpc>
-              <a:spcBef>
-                <a:spcPts val="0"/>
-              </a:spcBef>
-              <a:spcAft>
-                <a:spcPts val="0"/>
-              </a:spcAft>
-              <a:buClr>
-                <a:srgbClr val="999999"/>
-              </a:buClr>
-              <a:buSzPts val="1800"/>
-              <a:buFont typeface="Georgia"/>
-              <a:buChar char="●"/>
-              <a:defRPr sz="1800" b="0" i="0" u="none" strike="noStrike" cap="none">
-                <a:solidFill>
-                  <a:srgbClr val="111111"/>
-                </a:solidFill>
-                <a:latin typeface="Georgia"/>
-                <a:ea typeface="Georgia"/>
-                <a:cs typeface="Georgia"/>
-                <a:sym typeface="Georgia"/>
-              </a:defRPr>
-            </a:lvl4pPr>
-            <a:lvl5pPr marL="2286000" marR="0" lvl="4" indent="-342900" algn="l" rtl="0">
-              <a:lnSpc>
-                <a:spcPct val="100000"/>
-              </a:lnSpc>
-              <a:spcBef>
-                <a:spcPts val="0"/>
-              </a:spcBef>
-              <a:spcAft>
-                <a:spcPts val="0"/>
-              </a:spcAft>
-              <a:buClr>
-                <a:srgbClr val="999999"/>
-              </a:buClr>
-              <a:buSzPts val="1800"/>
-              <a:buFont typeface="Georgia"/>
-              <a:buChar char="○"/>
-              <a:defRPr sz="1800" b="0" i="0" u="none" strike="noStrike" cap="none">
-                <a:solidFill>
-                  <a:srgbClr val="111111"/>
-                </a:solidFill>
-                <a:latin typeface="Georgia"/>
-                <a:ea typeface="Georgia"/>
-                <a:cs typeface="Georgia"/>
-                <a:sym typeface="Georgia"/>
-              </a:defRPr>
-            </a:lvl5pPr>
-            <a:lvl6pPr marL="2743200" marR="0" lvl="5" indent="-342900" algn="l" rtl="0">
-              <a:lnSpc>
-                <a:spcPct val="100000"/>
-              </a:lnSpc>
-              <a:spcBef>
-                <a:spcPts val="0"/>
-              </a:spcBef>
-              <a:spcAft>
-                <a:spcPts val="0"/>
-              </a:spcAft>
-              <a:buClr>
-                <a:srgbClr val="999999"/>
-              </a:buClr>
-              <a:buSzPts val="1800"/>
-              <a:buFont typeface="Georgia"/>
-              <a:buChar char="■"/>
-              <a:defRPr sz="1800" b="0" i="0" u="none" strike="noStrike" cap="none">
-                <a:solidFill>
-                  <a:srgbClr val="111111"/>
-                </a:solidFill>
-                <a:latin typeface="Georgia"/>
-                <a:ea typeface="Georgia"/>
-                <a:cs typeface="Georgia"/>
-                <a:sym typeface="Georgia"/>
-              </a:defRPr>
-            </a:lvl6pPr>
-            <a:lvl7pPr marL="3200400" marR="0" lvl="6" indent="-342900" algn="l" rtl="0">
-              <a:lnSpc>
-                <a:spcPct val="100000"/>
-              </a:lnSpc>
-              <a:spcBef>
-                <a:spcPts val="0"/>
-              </a:spcBef>
-              <a:spcAft>
-                <a:spcPts val="0"/>
-              </a:spcAft>
-              <a:buClr>
-                <a:srgbClr val="999999"/>
-              </a:buClr>
-              <a:buSzPts val="1800"/>
-              <a:buFont typeface="Georgia"/>
-              <a:buChar char="●"/>
-              <a:defRPr sz="1800" b="0" i="0" u="none" strike="noStrike" cap="none">
-                <a:solidFill>
-                  <a:srgbClr val="111111"/>
-                </a:solidFill>
-                <a:latin typeface="Georgia"/>
-                <a:ea typeface="Georgia"/>
-                <a:cs typeface="Georgia"/>
-                <a:sym typeface="Georgia"/>
-              </a:defRPr>
-            </a:lvl7pPr>
-            <a:lvl8pPr marL="3657600" marR="0" lvl="7" indent="-342900" algn="l" rtl="0">
-              <a:lnSpc>
-                <a:spcPct val="100000"/>
-              </a:lnSpc>
-              <a:spcBef>
-                <a:spcPts val="0"/>
-              </a:spcBef>
-              <a:spcAft>
-                <a:spcPts val="0"/>
-              </a:spcAft>
-              <a:buClr>
-                <a:srgbClr val="999999"/>
-              </a:buClr>
-              <a:buSzPts val="1800"/>
-              <a:buFont typeface="Georgia"/>
-              <a:buChar char="○"/>
-              <a:defRPr sz="1800" b="0" i="0" u="none" strike="noStrike" cap="none">
-                <a:solidFill>
-                  <a:srgbClr val="111111"/>
-                </a:solidFill>
-                <a:latin typeface="Georgia"/>
-                <a:ea typeface="Georgia"/>
-                <a:cs typeface="Georgia"/>
-                <a:sym typeface="Georgia"/>
-              </a:defRPr>
-            </a:lvl8pPr>
-            <a:lvl9pPr marL="4114800" marR="0" lvl="8" indent="-342900" algn="l" rtl="0">
-              <a:lnSpc>
-                <a:spcPct val="100000"/>
-              </a:lnSpc>
-              <a:spcBef>
-                <a:spcPts val="0"/>
-              </a:spcBef>
-              <a:spcAft>
-                <a:spcPts val="0"/>
-              </a:spcAft>
-              <a:buClr>
-                <a:srgbClr val="999999"/>
-              </a:buClr>
-              <a:buSzPts val="1800"/>
-              <a:buFont typeface="Georgia"/>
-              <a:buChar char="■"/>
-              <a:defRPr sz="1800" b="0" i="0" u="none" strike="noStrike" cap="none">
-                <a:solidFill>
-                  <a:srgbClr val="111111"/>
-                </a:solidFill>
-                <a:latin typeface="Georgia"/>
-                <a:ea typeface="Georgia"/>
-                <a:cs typeface="Georgia"/>
-                <a:sym typeface="Georgia"/>
-              </a:defRPr>
-            </a:lvl9pPr>
-          </a:lstStyle>
-          <a:p>
-            <a:pPr marL="38100" indent="0" algn="ctr">
-              <a:buFont typeface="Georgia"/>
-              <a:buNone/>
-            </a:pPr>
-            <a:r>
-              <a:rPr lang="pt-BR" b="1" dirty="0" smtClean="0"/>
-              <a:t>MISSÃO:</a:t>
-            </a:r>
-            <a:endParaRPr lang="pt-BR" b="1" dirty="0"/>
-          </a:p>
-        </p:txBody>
-      </p:sp>
+        </p:nvPicPr>
+        <p:blipFill rotWithShape="1">
+          <a:blip r:embed="rId4"/>
+          <a:srcRect t="25060" b="6887"/>
+          <a:stretch/>
+        </p:blipFill>
+        <p:spPr>
+          <a:xfrm>
+            <a:off x="1181906" y="2980340"/>
+            <a:ext cx="6780184" cy="2594158"/>
+          </a:xfrm>
+          <a:prstGeom prst="rect">
+            <a:avLst/>
+          </a:prstGeom>
+        </p:spPr>
+      </p:pic>
     </p:spTree>
     <p:extLst>
       <p:ext uri="{BB962C8B-B14F-4D97-AF65-F5344CB8AC3E}">
-        <p14:creationId xmlns:p14="http://schemas.microsoft.com/office/powerpoint/2010/main" val="2289272832"/>
+        <p14:creationId xmlns:p14="http://schemas.microsoft.com/office/powerpoint/2010/main" val="3237526908"/>
       </p:ext>
     </p:extLst>
   </p:cSld>
@@ -9315,6 +10815,11 @@
           <a:prstGeom prst="rect">
             <a:avLst/>
           </a:prstGeom>
+          <a:ln>
+            <a:solidFill>
+              <a:schemeClr val="tx1"/>
+            </a:solidFill>
+          </a:ln>
         </p:spPr>
         <p:txBody>
           <a:bodyPr spcFirstLastPara="1" wrap="square" lIns="91425" tIns="91425" rIns="91425" bIns="91425" anchor="t" anchorCtr="0">
@@ -9337,7 +10842,7 @@
                   <a:schemeClr val="tx1"/>
                 </a:solidFill>
               </a:rPr>
-              <a:t>Tecnologia e gravidez</a:t>
+              <a:t>Referencial Teórico</a:t>
             </a:r>
             <a:endParaRPr dirty="0">
               <a:solidFill>
@@ -9385,15 +10890,7 @@
             </a:r>
             <a:r>
               <a:rPr lang="pt-BR" sz="2000" b="1" dirty="0"/>
-              <a:t>contribuição das tecnologias não-invasivas de cuidado de enfermagem para o </a:t>
-            </a:r>
-            <a:r>
-              <a:rPr lang="pt-BR" sz="2000" b="1" dirty="0" err="1"/>
-              <a:t>empoderamento</a:t>
-            </a:r>
-            <a:r>
-              <a:rPr lang="pt-BR" sz="2000" b="1" dirty="0"/>
-              <a:t> feminino na gravidez e no </a:t>
+              <a:t>contribuição das tecnologias não-invasivas de cuidado de enfermagem para o empoderamento feminino na gravidez e no </a:t>
             </a:r>
             <a:r>
               <a:rPr lang="pt-BR" sz="2000" b="1" dirty="0" smtClean="0"/>
@@ -9573,6 +11070,11 @@
           <a:prstGeom prst="rect">
             <a:avLst/>
           </a:prstGeom>
+          <a:ln>
+            <a:solidFill>
+              <a:schemeClr val="tx1"/>
+            </a:solidFill>
+          </a:ln>
         </p:spPr>
         <p:txBody>
           <a:bodyPr spcFirstLastPara="1" wrap="square" lIns="91425" tIns="91425" rIns="91425" bIns="91425" anchor="t" anchorCtr="0">
@@ -9595,7 +11097,7 @@
                   <a:schemeClr val="tx1"/>
                 </a:solidFill>
               </a:rPr>
-              <a:t>Tecnologia e gravidez</a:t>
+              <a:t>Referencial Teórico</a:t>
             </a:r>
             <a:endParaRPr dirty="0">
               <a:solidFill>
@@ -9724,6 +11226,215 @@
 </file>
 
 <file path=ppt/slides/slide8.xml><?xml version="1.0" encoding="utf-8"?>
+<p:sld xmlns:a="http://schemas.openxmlformats.org/drawingml/2006/main" xmlns:r="http://schemas.openxmlformats.org/officeDocument/2006/relationships" xmlns:p="http://schemas.openxmlformats.org/presentationml/2006/main">
+  <p:cSld>
+    <p:spTree>
+      <p:nvGrpSpPr>
+        <p:cNvPr id="1" name="Shape 131"/>
+        <p:cNvGrpSpPr/>
+        <p:nvPr/>
+      </p:nvGrpSpPr>
+      <p:grpSpPr>
+        <a:xfrm>
+          <a:off x="0" y="0"/>
+          <a:ext cx="0" cy="0"/>
+          <a:chOff x="0" y="0"/>
+          <a:chExt cx="0" cy="0"/>
+        </a:xfrm>
+      </p:grpSpPr>
+      <p:sp>
+        <p:nvSpPr>
+          <p:cNvPr id="132" name="Google Shape;132;p20"/>
+          <p:cNvSpPr txBox="1">
+            <a:spLocks noGrp="1"/>
+          </p:cNvSpPr>
+          <p:nvPr>
+            <p:ph type="title"/>
+          </p:nvPr>
+        </p:nvSpPr>
+        <p:spPr>
+          <a:xfrm>
+            <a:off x="533400" y="533400"/>
+            <a:ext cx="2382078" cy="1070113"/>
+          </a:xfrm>
+          <a:prstGeom prst="rect">
+            <a:avLst/>
+          </a:prstGeom>
+          <a:ln>
+            <a:solidFill>
+              <a:schemeClr val="tx1"/>
+            </a:solidFill>
+          </a:ln>
+        </p:spPr>
+        <p:txBody>
+          <a:bodyPr spcFirstLastPara="1" wrap="square" lIns="91425" tIns="91425" rIns="91425" bIns="91425" anchor="t" anchorCtr="0">
+            <a:noAutofit/>
+          </a:bodyPr>
+          <a:lstStyle/>
+          <a:p>
+            <a:pPr marL="0" lvl="0" indent="0" algn="ctr" rtl="0">
+              <a:spcBef>
+                <a:spcPts val="0"/>
+              </a:spcBef>
+              <a:spcAft>
+                <a:spcPts val="0"/>
+              </a:spcAft>
+              <a:buNone/>
+            </a:pPr>
+            <a:r>
+              <a:rPr lang="en" dirty="0" smtClean="0">
+                <a:solidFill>
+                  <a:schemeClr val="tx1"/>
+                </a:solidFill>
+              </a:rPr>
+              <a:t>Referencial Teórico</a:t>
+            </a:r>
+            <a:endParaRPr dirty="0">
+              <a:solidFill>
+                <a:schemeClr val="tx1"/>
+              </a:solidFill>
+            </a:endParaRPr>
+          </a:p>
+        </p:txBody>
+      </p:sp>
+      <p:sp>
+        <p:nvSpPr>
+          <p:cNvPr id="133" name="Google Shape;133;p20"/>
+          <p:cNvSpPr txBox="1">
+            <a:spLocks noGrp="1"/>
+          </p:cNvSpPr>
+          <p:nvPr>
+            <p:ph type="body" idx="1"/>
+          </p:nvPr>
+        </p:nvSpPr>
+        <p:spPr>
+          <a:xfrm>
+            <a:off x="1724439" y="3112296"/>
+            <a:ext cx="6442364" cy="2438400"/>
+          </a:xfrm>
+          <a:prstGeom prst="rect">
+            <a:avLst/>
+          </a:prstGeom>
+        </p:spPr>
+        <p:txBody>
+          <a:bodyPr spcFirstLastPara="1" wrap="square" lIns="91425" tIns="91425" rIns="91425" bIns="91425" anchor="t" anchorCtr="0">
+            <a:noAutofit/>
+          </a:bodyPr>
+          <a:lstStyle/>
+          <a:p>
+            <a:pPr marL="0" lvl="0" indent="0" algn="ctr">
+              <a:buNone/>
+            </a:pPr>
+            <a:r>
+              <a:rPr lang="pt-BR" sz="2000" dirty="0"/>
+              <a:t>O resultado do estudo feito, mostra que a tecnologia afetou positivamente na auto confiança no parto, relação </a:t>
+            </a:r>
+            <a:r>
+              <a:rPr lang="pt-BR" sz="2000" dirty="0" smtClean="0"/>
+              <a:t>mãe-bebê e </a:t>
+            </a:r>
+            <a:r>
+              <a:rPr lang="pt-BR" sz="2000" dirty="0"/>
+              <a:t>segundo Nascimento (</a:t>
+            </a:r>
+            <a:r>
+              <a:rPr lang="pt-BR" sz="2000" dirty="0" smtClean="0"/>
+              <a:t>2011), tornando-se </a:t>
+            </a:r>
+            <a:r>
+              <a:rPr lang="pt-BR" sz="2000" dirty="0"/>
+              <a:t>mais preparadas e capacitadas no seu dia a dia. </a:t>
+            </a:r>
+            <a:endParaRPr sz="2000" dirty="0"/>
+          </a:p>
+        </p:txBody>
+      </p:sp>
+      <p:sp>
+        <p:nvSpPr>
+          <p:cNvPr id="135" name="Google Shape;135;p20"/>
+          <p:cNvSpPr txBox="1">
+            <a:spLocks noGrp="1"/>
+          </p:cNvSpPr>
+          <p:nvPr>
+            <p:ph type="sldNum" idx="12"/>
+          </p:nvPr>
+        </p:nvSpPr>
+        <p:spPr>
+          <a:xfrm>
+            <a:off x="533409" y="6061952"/>
+            <a:ext cx="548700" cy="525000"/>
+          </a:xfrm>
+          <a:prstGeom prst="rect">
+            <a:avLst/>
+          </a:prstGeom>
+        </p:spPr>
+        <p:txBody>
+          <a:bodyPr spcFirstLastPara="1" wrap="square" lIns="91425" tIns="91425" rIns="91425" bIns="91425" anchor="t" anchorCtr="0">
+            <a:noAutofit/>
+          </a:bodyPr>
+          <a:lstStyle/>
+          <a:p>
+            <a:pPr marL="0" lvl="0" indent="0" algn="l" rtl="0">
+              <a:spcBef>
+                <a:spcPts val="0"/>
+              </a:spcBef>
+              <a:spcAft>
+                <a:spcPts val="0"/>
+              </a:spcAft>
+              <a:buNone/>
+            </a:pPr>
+            <a:fld id="{00000000-1234-1234-1234-123412341234}" type="slidenum">
+              <a:rPr lang="en"/>
+              <a:t>8</a:t>
+            </a:fld>
+            <a:endParaRPr/>
+          </a:p>
+        </p:txBody>
+      </p:sp>
+      <p:pic>
+        <p:nvPicPr>
+          <p:cNvPr id="3" name="Imagem 2"/>
+          <p:cNvPicPr>
+            <a:picLocks noChangeAspect="1"/>
+          </p:cNvPicPr>
+          <p:nvPr/>
+        </p:nvPicPr>
+        <p:blipFill rotWithShape="1">
+          <a:blip r:embed="rId3"/>
+          <a:srcRect l="17102" t="16038" r="10580" b="17713"/>
+          <a:stretch/>
+        </p:blipFill>
+        <p:spPr>
+          <a:xfrm>
+            <a:off x="1553968" y="2517913"/>
+            <a:ext cx="6612835" cy="3405810"/>
+          </a:xfrm>
+          <a:prstGeom prst="rect">
+            <a:avLst/>
+          </a:prstGeom>
+        </p:spPr>
+      </p:pic>
+    </p:spTree>
+    <p:extLst>
+      <p:ext uri="{BB962C8B-B14F-4D97-AF65-F5344CB8AC3E}">
+        <p14:creationId xmlns:p14="http://schemas.microsoft.com/office/powerpoint/2010/main" val="3190329260"/>
+      </p:ext>
+    </p:extLst>
+  </p:cSld>
+  <p:clrMapOvr>
+    <a:masterClrMapping/>
+  </p:clrMapOvr>
+  <p:timing>
+    <p:tnLst>
+      <p:par>
+        <p:cTn id="1" dur="indefinite" restart="never" nodeType="tmRoot"/>
+      </p:par>
+    </p:tnLst>
+  </p:timing>
+</p:sld>
+</file>
+
+<file path=ppt/slides/slide9.xml><?xml version="1.0" encoding="utf-8"?>
 <p:sld xmlns:a="http://schemas.openxmlformats.org/drawingml/2006/main" xmlns:r="http://schemas.openxmlformats.org/officeDocument/2006/relationships" xmlns:p="http://schemas.openxmlformats.org/presentationml/2006/main" show="0">
   <p:cSld>
     <p:spTree>
@@ -9758,6 +11469,11 @@
           <a:prstGeom prst="rect">
             <a:avLst/>
           </a:prstGeom>
+          <a:ln>
+            <a:solidFill>
+              <a:schemeClr val="tx1"/>
+            </a:solidFill>
+          </a:ln>
         </p:spPr>
         <p:txBody>
           <a:bodyPr spcFirstLastPara="1" wrap="square" lIns="91425" tIns="91425" rIns="91425" bIns="91425" anchor="t" anchorCtr="0">
@@ -9780,7 +11496,7 @@
                   <a:schemeClr val="tx1"/>
                 </a:solidFill>
               </a:rPr>
-              <a:t>Tecnologia e gravidez</a:t>
+              <a:t>Referencial Teórico</a:t>
             </a:r>
             <a:endParaRPr dirty="0">
               <a:solidFill>
@@ -9849,15 +11565,7 @@
             </a:r>
             <a:r>
               <a:rPr lang="pt-BR" sz="2000" dirty="0"/>
-              <a:t>sua vivência e </a:t>
-            </a:r>
-            <a:r>
-              <a:rPr lang="pt-BR" sz="2000" dirty="0" err="1"/>
-              <a:t>empoderamento</a:t>
-            </a:r>
-            <a:r>
-              <a:rPr lang="pt-BR" sz="2000" dirty="0"/>
-              <a:t>.</a:t>
+              <a:t>sua vivência e empoderamento.</a:t>
             </a:r>
             <a:endParaRPr sz="2000" dirty="0"/>
           </a:p>
@@ -9899,7 +11607,7 @@
             </a:pPr>
             <a:fld id="{00000000-1234-1234-1234-123412341234}" type="slidenum">
               <a:rPr lang="en"/>
-              <a:t>8</a:t>
+              <a:t>9</a:t>
             </a:fld>
             <a:endParaRPr/>
           </a:p>
@@ -9918,187 +11626,6 @@
   <p:transition>
     <p:fade thruBlk="1"/>
   </p:transition>
-  <p:timing>
-    <p:tnLst>
-      <p:par>
-        <p:cTn id="1" dur="indefinite" restart="never" nodeType="tmRoot"/>
-      </p:par>
-    </p:tnLst>
-  </p:timing>
-</p:sld>
-</file>
-
-<file path=ppt/slides/slide9.xml><?xml version="1.0" encoding="utf-8"?>
-<p:sld xmlns:a="http://schemas.openxmlformats.org/drawingml/2006/main" xmlns:r="http://schemas.openxmlformats.org/officeDocument/2006/relationships" xmlns:p="http://schemas.openxmlformats.org/presentationml/2006/main">
-  <p:cSld>
-    <p:spTree>
-      <p:nvGrpSpPr>
-        <p:cNvPr id="1" name="Shape 131"/>
-        <p:cNvGrpSpPr/>
-        <p:nvPr/>
-      </p:nvGrpSpPr>
-      <p:grpSpPr>
-        <a:xfrm>
-          <a:off x="0" y="0"/>
-          <a:ext cx="0" cy="0"/>
-          <a:chOff x="0" y="0"/>
-          <a:chExt cx="0" cy="0"/>
-        </a:xfrm>
-      </p:grpSpPr>
-      <p:sp>
-        <p:nvSpPr>
-          <p:cNvPr id="132" name="Google Shape;132;p20"/>
-          <p:cNvSpPr txBox="1">
-            <a:spLocks noGrp="1"/>
-          </p:cNvSpPr>
-          <p:nvPr>
-            <p:ph type="title"/>
-          </p:nvPr>
-        </p:nvSpPr>
-        <p:spPr>
-          <a:xfrm>
-            <a:off x="533400" y="533400"/>
-            <a:ext cx="2382078" cy="1070113"/>
-          </a:xfrm>
-          <a:prstGeom prst="rect">
-            <a:avLst/>
-          </a:prstGeom>
-        </p:spPr>
-        <p:txBody>
-          <a:bodyPr spcFirstLastPara="1" wrap="square" lIns="91425" tIns="91425" rIns="91425" bIns="91425" anchor="t" anchorCtr="0">
-            <a:noAutofit/>
-          </a:bodyPr>
-          <a:lstStyle/>
-          <a:p>
-            <a:pPr marL="0" lvl="0" indent="0" algn="ctr" rtl="0">
-              <a:spcBef>
-                <a:spcPts val="0"/>
-              </a:spcBef>
-              <a:spcAft>
-                <a:spcPts val="0"/>
-              </a:spcAft>
-              <a:buNone/>
-            </a:pPr>
-            <a:r>
-              <a:rPr lang="en" dirty="0" smtClean="0">
-                <a:solidFill>
-                  <a:schemeClr val="tx1"/>
-                </a:solidFill>
-              </a:rPr>
-              <a:t>Tecnologia e gravidez</a:t>
-            </a:r>
-            <a:endParaRPr dirty="0">
-              <a:solidFill>
-                <a:schemeClr val="tx1"/>
-              </a:solidFill>
-            </a:endParaRPr>
-          </a:p>
-        </p:txBody>
-      </p:sp>
-      <p:sp>
-        <p:nvSpPr>
-          <p:cNvPr id="133" name="Google Shape;133;p20"/>
-          <p:cNvSpPr txBox="1">
-            <a:spLocks noGrp="1"/>
-          </p:cNvSpPr>
-          <p:nvPr>
-            <p:ph type="body" idx="1"/>
-          </p:nvPr>
-        </p:nvSpPr>
-        <p:spPr>
-          <a:xfrm>
-            <a:off x="1724439" y="3112296"/>
-            <a:ext cx="6442364" cy="2438400"/>
-          </a:xfrm>
-          <a:prstGeom prst="rect">
-            <a:avLst/>
-          </a:prstGeom>
-        </p:spPr>
-        <p:txBody>
-          <a:bodyPr spcFirstLastPara="1" wrap="square" lIns="91425" tIns="91425" rIns="91425" bIns="91425" anchor="t" anchorCtr="0">
-            <a:noAutofit/>
-          </a:bodyPr>
-          <a:lstStyle/>
-          <a:p>
-            <a:pPr marL="0" lvl="0" indent="0" algn="ctr">
-              <a:buNone/>
-            </a:pPr>
-            <a:r>
-              <a:rPr lang="pt-BR" sz="2000" dirty="0"/>
-              <a:t>O resultado do estudo feito, mostra que a tecnologia afetou positivamente na auto confiança no parto, relação </a:t>
-            </a:r>
-            <a:r>
-              <a:rPr lang="pt-BR" sz="2000" dirty="0" smtClean="0"/>
-              <a:t>mãe-bebê e </a:t>
-            </a:r>
-            <a:r>
-              <a:rPr lang="pt-BR" sz="2000" dirty="0"/>
-              <a:t>segundo Nascimento (</a:t>
-            </a:r>
-            <a:r>
-              <a:rPr lang="pt-BR" sz="2000" dirty="0" smtClean="0"/>
-              <a:t>2011), tornando-se </a:t>
-            </a:r>
-            <a:r>
-              <a:rPr lang="pt-BR" sz="2000" dirty="0"/>
-              <a:t>mais preparadas e capacitadas no seu dia a dia. </a:t>
-            </a:r>
-            <a:endParaRPr sz="2000" dirty="0"/>
-          </a:p>
-        </p:txBody>
-      </p:sp>
-      <p:sp>
-        <p:nvSpPr>
-          <p:cNvPr id="135" name="Google Shape;135;p20"/>
-          <p:cNvSpPr txBox="1">
-            <a:spLocks noGrp="1"/>
-          </p:cNvSpPr>
-          <p:nvPr>
-            <p:ph type="sldNum" idx="12"/>
-          </p:nvPr>
-        </p:nvSpPr>
-        <p:spPr>
-          <a:xfrm>
-            <a:off x="533409" y="6061952"/>
-            <a:ext cx="548700" cy="525000"/>
-          </a:xfrm>
-          <a:prstGeom prst="rect">
-            <a:avLst/>
-          </a:prstGeom>
-        </p:spPr>
-        <p:txBody>
-          <a:bodyPr spcFirstLastPara="1" wrap="square" lIns="91425" tIns="91425" rIns="91425" bIns="91425" anchor="t" anchorCtr="0">
-            <a:noAutofit/>
-          </a:bodyPr>
-          <a:lstStyle/>
-          <a:p>
-            <a:pPr marL="0" lvl="0" indent="0" algn="l" rtl="0">
-              <a:spcBef>
-                <a:spcPts val="0"/>
-              </a:spcBef>
-              <a:spcAft>
-                <a:spcPts val="0"/>
-              </a:spcAft>
-              <a:buNone/>
-            </a:pPr>
-            <a:fld id="{00000000-1234-1234-1234-123412341234}" type="slidenum">
-              <a:rPr lang="en"/>
-              <a:t>9</a:t>
-            </a:fld>
-            <a:endParaRPr/>
-          </a:p>
-        </p:txBody>
-      </p:sp>
-    </p:spTree>
-    <p:extLst>
-      <p:ext uri="{BB962C8B-B14F-4D97-AF65-F5344CB8AC3E}">
-        <p14:creationId xmlns:p14="http://schemas.microsoft.com/office/powerpoint/2010/main" val="1183611099"/>
-      </p:ext>
-    </p:extLst>
-  </p:cSld>
-  <p:clrMapOvr>
-    <a:masterClrMapping/>
-  </p:clrMapOvr>
   <p:timing>
     <p:tnLst>
       <p:par>

</xml_diff>